<commit_message>
eerste opzet ronald praatjes
</commit_message>
<xml_diff>
--- a/devoxx_2017_cgi.pptx
+++ b/devoxx_2017_cgi.pptx
@@ -5,19 +5,23 @@
     <p:sldMasterId id="2147483648" r:id="rId5"/>
   </p:sldMasterIdLst>
   <p:notesMasterIdLst>
-    <p:notesMasterId r:id="rId13"/>
+    <p:notesMasterId r:id="rId17"/>
   </p:notesMasterIdLst>
   <p:handoutMasterIdLst>
-    <p:handoutMasterId r:id="rId14"/>
+    <p:handoutMasterId r:id="rId18"/>
   </p:handoutMasterIdLst>
   <p:sldIdLst>
     <p:sldId id="315" r:id="rId6"/>
     <p:sldId id="365" r:id="rId7"/>
     <p:sldId id="366" r:id="rId8"/>
     <p:sldId id="367" r:id="rId9"/>
-    <p:sldId id="369" r:id="rId10"/>
-    <p:sldId id="370" r:id="rId11"/>
-    <p:sldId id="372" r:id="rId12"/>
+    <p:sldId id="373" r:id="rId10"/>
+    <p:sldId id="376" r:id="rId11"/>
+    <p:sldId id="374" r:id="rId12"/>
+    <p:sldId id="375" r:id="rId13"/>
+    <p:sldId id="369" r:id="rId14"/>
+    <p:sldId id="370" r:id="rId15"/>
+    <p:sldId id="372" r:id="rId16"/>
   </p:sldIdLst>
   <p:sldSz cx="9144000" cy="6858000" type="screen4x3"/>
   <p:notesSz cx="6858000" cy="9144000"/>
@@ -116,7 +120,91 @@
       </a:defRPr>
     </a:lvl9pPr>
   </p:defaultTextStyle>
+  <p:extLst>
+    <p:ext uri="{EFAFB233-063F-42B5-8137-9DF3F51BA10A}">
+      <p15:sldGuideLst xmlns:p15="http://schemas.microsoft.com/office/powerpoint/2012/main">
+        <p15:guide id="1" orient="horz" pos="835">
+          <p15:clr>
+            <a:srgbClr val="A4A3A4"/>
+          </p15:clr>
+        </p15:guide>
+        <p15:guide id="2" orient="horz" pos="798">
+          <p15:clr>
+            <a:srgbClr val="A4A3A4"/>
+          </p15:clr>
+        </p15:guide>
+        <p15:guide id="3" orient="horz" pos="117">
+          <p15:clr>
+            <a:srgbClr val="A4A3A4"/>
+          </p15:clr>
+        </p15:guide>
+        <p15:guide id="4" orient="horz" pos="4196">
+          <p15:clr>
+            <a:srgbClr val="A4A3A4"/>
+          </p15:clr>
+        </p15:guide>
+        <p15:guide id="5" orient="horz" pos="3874">
+          <p15:clr>
+            <a:srgbClr val="A4A3A4"/>
+          </p15:clr>
+        </p15:guide>
+        <p15:guide id="6" orient="horz" pos="2083">
+          <p15:clr>
+            <a:srgbClr val="A4A3A4"/>
+          </p15:clr>
+        </p15:guide>
+        <p15:guide id="7" orient="horz" pos="697">
+          <p15:clr>
+            <a:srgbClr val="A4A3A4"/>
+          </p15:clr>
+        </p15:guide>
+        <p15:guide id="8" pos="2775">
+          <p15:clr>
+            <a:srgbClr val="A4A3A4"/>
+          </p15:clr>
+        </p15:guide>
+        <p15:guide id="9" pos="3000">
+          <p15:clr>
+            <a:srgbClr val="A4A3A4"/>
+          </p15:clr>
+        </p15:guide>
+        <p15:guide id="10" pos="282">
+          <p15:clr>
+            <a:srgbClr val="A4A3A4"/>
+          </p15:clr>
+        </p15:guide>
+        <p15:guide id="11" pos="2880">
+          <p15:clr>
+            <a:srgbClr val="A4A3A4"/>
+          </p15:clr>
+        </p15:guide>
+        <p15:guide id="12" pos="5480">
+          <p15:clr>
+            <a:srgbClr val="A4A3A4"/>
+          </p15:clr>
+        </p15:guide>
+      </p15:sldGuideLst>
+    </p:ext>
+    <p:ext uri="{2D200454-40CA-4A62-9FC3-DE9A4176ACB9}">
+      <p15:notesGuideLst xmlns:p15="http://schemas.microsoft.com/office/powerpoint/2012/main">
+        <p15:guide id="1" orient="horz" pos="2880">
+          <p15:clr>
+            <a:srgbClr val="A4A3A4"/>
+          </p15:clr>
+        </p15:guide>
+        <p15:guide id="2" pos="2160">
+          <p15:clr>
+            <a:srgbClr val="A4A3A4"/>
+          </p15:clr>
+        </p15:guide>
+      </p15:notesGuideLst>
+    </p:ext>
+  </p:extLst>
 </p:presentation>
+</file>
+
+<file path=ppt/revisionInfo.xml><?xml version="1.0" encoding="utf-8"?>
+<p1510:revInfo xmlns:a="http://schemas.openxmlformats.org/drawingml/2006/main" xmlns:r="http://schemas.openxmlformats.org/officeDocument/2006/relationships" xmlns:p1510="http://schemas.microsoft.com/office/powerpoint/2015/10/main"/>
 </file>
 
 <file path=ppt/handoutMasters/handoutMaster1.xml><?xml version="1.0" encoding="utf-8"?>
@@ -206,7 +294,7 @@
                 <a:latin typeface="Arial" pitchFamily="34" charset="0"/>
               </a:rPr>
               <a:pPr/>
-              <a:t>11/23/2017</a:t>
+              <a:t>11/25/2017</a:t>
             </a:fld>
             <a:endParaRPr lang="en-US" dirty="0">
               <a:latin typeface="Arial" pitchFamily="34" charset="0"/>
@@ -385,7 +473,7 @@
             <a:fld id="{B5D7A87D-1CDA-443F-BAE3-82C9C05446C3}" type="datetimeFigureOut">
               <a:rPr lang="en-US" smtClean="0"/>
               <a:pPr/>
-              <a:t>11/23/2017</a:t>
+              <a:t>11/25/2017</a:t>
             </a:fld>
             <a:endParaRPr lang="en-US" dirty="0"/>
           </a:p>
@@ -451,35 +539,35 @@
           <a:p>
             <a:pPr lvl="0"/>
             <a:r>
-              <a:rPr lang="en-US" smtClean="0"/>
+              <a:rPr lang="en-US"/>
               <a:t>Click to edit Master text styles</a:t>
             </a:r>
           </a:p>
           <a:p>
             <a:pPr lvl="1"/>
             <a:r>
-              <a:rPr lang="en-US" smtClean="0"/>
+              <a:rPr lang="en-US"/>
               <a:t>Second level</a:t>
             </a:r>
           </a:p>
           <a:p>
             <a:pPr lvl="2"/>
             <a:r>
-              <a:rPr lang="en-US" smtClean="0"/>
+              <a:rPr lang="en-US"/>
               <a:t>Third level</a:t>
             </a:r>
           </a:p>
           <a:p>
             <a:pPr lvl="3"/>
             <a:r>
-              <a:rPr lang="en-US" smtClean="0"/>
+              <a:rPr lang="en-US"/>
               <a:t>Fourth level</a:t>
             </a:r>
           </a:p>
           <a:p>
             <a:pPr lvl="4"/>
             <a:r>
-              <a:rPr lang="en-US" smtClean="0"/>
+              <a:rPr lang="en-US"/>
               <a:t>Fifth level</a:t>
             </a:r>
             <a:endParaRPr lang="en-US" dirty="0"/>
@@ -1056,7 +1144,7 @@
             <a:fld id="{20B9C825-F38E-45BB-92C1-043DE61C9183}" type="slidenum">
               <a:rPr lang="en-US" smtClean="0"/>
               <a:pPr/>
-              <a:t>5</a:t>
+              <a:t>9</a:t>
             </a:fld>
             <a:endParaRPr lang="en-US" dirty="0"/>
           </a:p>
@@ -1138,7 +1226,7 @@
             <a:fld id="{20B9C825-F38E-45BB-92C1-043DE61C9183}" type="slidenum">
               <a:rPr lang="en-US" smtClean="0"/>
               <a:pPr/>
-              <a:t>6</a:t>
+              <a:t>10</a:t>
             </a:fld>
             <a:endParaRPr lang="en-US" dirty="0"/>
           </a:p>
@@ -7924,14 +8012,14 @@
           </a:lstStyle>
           <a:p>
             <a:r>
-              <a:rPr lang="en-US" noProof="0" smtClean="0"/>
+              <a:rPr lang="en-US" noProof="0"/>
               <a:t>Click to edit Master </a:t>
             </a:r>
             <a:br>
-              <a:rPr lang="en-US" noProof="0" smtClean="0"/>
+              <a:rPr lang="en-US" noProof="0"/>
             </a:br>
             <a:r>
-              <a:rPr lang="en-US" noProof="0" smtClean="0"/>
+              <a:rPr lang="en-US" noProof="0"/>
               <a:t>title style</a:t>
             </a:r>
             <a:endParaRPr lang="en-US" noProof="0" dirty="0"/>
@@ -8059,10 +8147,10 @@
           </a:lstStyle>
           <a:p>
             <a:r>
-              <a:rPr lang="en-US" noProof="0" smtClean="0"/>
+              <a:rPr lang="en-US" noProof="0"/>
               <a:t>Click to edit Master subtitle style</a:t>
             </a:r>
-            <a:endParaRPr lang="en-US" noProof="0" dirty="0" smtClean="0"/>
+            <a:endParaRPr lang="en-US" noProof="0" dirty="0"/>
           </a:p>
         </p:txBody>
       </p:sp>
@@ -8113,7 +8201,7 @@
               <a:defRPr/>
             </a:pPr>
             <a:r>
-              <a:rPr lang="en-US" sz="1100" kern="1200" noProof="0" dirty="0" smtClean="0">
+              <a:rPr lang="en-US" sz="1100" kern="1200" noProof="0" dirty="0">
                 <a:solidFill>
                   <a:srgbClr val="666666"/>
                 </a:solidFill>
@@ -8158,13 +8246,6 @@
   <p:transition>
     <p:fade/>
   </p:transition>
-  <p:timing>
-    <p:tnLst>
-      <p:par>
-        <p:cTn id="1" dur="indefinite" restart="never" nodeType="tmRoot"/>
-      </p:par>
-    </p:tnLst>
-  </p:timing>
 </p:sldLayout>
 </file>
 
@@ -8295,7 +8376,7 @@
           </a:lstStyle>
           <a:p>
             <a:r>
-              <a:rPr lang="en-US" smtClean="0"/>
+              <a:rPr lang="en-US"/>
               <a:t>Click icon to add picture</a:t>
             </a:r>
             <a:endParaRPr lang="en-US" dirty="0"/>
@@ -8328,7 +8409,7 @@
           <a:lstStyle/>
           <a:p>
             <a:r>
-              <a:rPr lang="en-US" noProof="0" smtClean="0"/>
+              <a:rPr lang="en-US" noProof="0"/>
               <a:t>Click to edit Master title style</a:t>
             </a:r>
             <a:endParaRPr lang="en-US" noProof="0" dirty="0"/>
@@ -8484,35 +8565,35 @@
           <a:p>
             <a:pPr lvl="0"/>
             <a:r>
-              <a:rPr lang="en-US" smtClean="0"/>
+              <a:rPr lang="en-US"/>
               <a:t>Click to edit Master text styles</a:t>
             </a:r>
           </a:p>
           <a:p>
             <a:pPr lvl="1"/>
             <a:r>
-              <a:rPr lang="en-US" smtClean="0"/>
+              <a:rPr lang="en-US"/>
               <a:t>Second level</a:t>
             </a:r>
           </a:p>
           <a:p>
             <a:pPr lvl="2"/>
             <a:r>
-              <a:rPr lang="en-US" smtClean="0"/>
+              <a:rPr lang="en-US"/>
               <a:t>Third level</a:t>
             </a:r>
           </a:p>
           <a:p>
             <a:pPr lvl="3"/>
             <a:r>
-              <a:rPr lang="en-US" smtClean="0"/>
+              <a:rPr lang="en-US"/>
               <a:t>Fourth level</a:t>
             </a:r>
           </a:p>
           <a:p>
             <a:pPr lvl="4"/>
             <a:r>
-              <a:rPr lang="en-US" smtClean="0"/>
+              <a:rPr lang="en-US"/>
               <a:t>Fifth level</a:t>
             </a:r>
             <a:endParaRPr lang="en-US" dirty="0"/>
@@ -9010,7 +9091,7 @@
           </a:lstStyle>
           <a:p>
             <a:r>
-              <a:rPr lang="en-US" smtClean="0"/>
+              <a:rPr lang="en-US"/>
               <a:t>Click icon to add picture</a:t>
             </a:r>
             <a:endParaRPr lang="en-US" dirty="0"/>
@@ -9055,7 +9136,7 @@
           </a:lstStyle>
           <a:p>
             <a:r>
-              <a:rPr lang="en-US" smtClean="0"/>
+              <a:rPr lang="en-US"/>
               <a:t>Click icon to add picture</a:t>
             </a:r>
             <a:endParaRPr lang="en-US" dirty="0"/>
@@ -9100,7 +9181,7 @@
           </a:lstStyle>
           <a:p>
             <a:r>
-              <a:rPr lang="en-US" smtClean="0"/>
+              <a:rPr lang="en-US"/>
               <a:t>Click icon to add picture</a:t>
             </a:r>
             <a:endParaRPr lang="en-US" dirty="0"/>
@@ -9133,7 +9214,7 @@
           <a:lstStyle/>
           <a:p>
             <a:r>
-              <a:rPr lang="en-US" noProof="0" smtClean="0"/>
+              <a:rPr lang="en-US" noProof="0"/>
               <a:t>Click to edit Master title style</a:t>
             </a:r>
             <a:endParaRPr lang="en-US" noProof="0" dirty="0"/>
@@ -9289,35 +9370,35 @@
           <a:p>
             <a:pPr lvl="0"/>
             <a:r>
-              <a:rPr lang="en-US" smtClean="0"/>
+              <a:rPr lang="en-US"/>
               <a:t>Click to edit text styles</a:t>
             </a:r>
           </a:p>
           <a:p>
             <a:pPr lvl="1"/>
             <a:r>
-              <a:rPr lang="en-US" smtClean="0"/>
+              <a:rPr lang="en-US"/>
               <a:t>Second level</a:t>
             </a:r>
           </a:p>
           <a:p>
             <a:pPr lvl="2"/>
             <a:r>
-              <a:rPr lang="en-US" smtClean="0"/>
+              <a:rPr lang="en-US"/>
               <a:t>Third level</a:t>
             </a:r>
           </a:p>
           <a:p>
             <a:pPr lvl="3"/>
             <a:r>
-              <a:rPr lang="en-US" smtClean="0"/>
+              <a:rPr lang="en-US"/>
               <a:t>Fourth level</a:t>
             </a:r>
           </a:p>
           <a:p>
             <a:pPr lvl="4"/>
             <a:r>
-              <a:rPr lang="en-US" smtClean="0"/>
+              <a:rPr lang="en-US"/>
               <a:t>Fifth level</a:t>
             </a:r>
             <a:endParaRPr lang="en-US" dirty="0"/>
@@ -9473,35 +9554,35 @@
           <a:p>
             <a:pPr lvl="0"/>
             <a:r>
-              <a:rPr lang="en-US" smtClean="0"/>
+              <a:rPr lang="en-US"/>
               <a:t>Click to edit text styles</a:t>
             </a:r>
           </a:p>
           <a:p>
             <a:pPr lvl="1"/>
             <a:r>
-              <a:rPr lang="en-US" smtClean="0"/>
+              <a:rPr lang="en-US"/>
               <a:t>Second level</a:t>
             </a:r>
           </a:p>
           <a:p>
             <a:pPr lvl="2"/>
             <a:r>
-              <a:rPr lang="en-US" smtClean="0"/>
+              <a:rPr lang="en-US"/>
               <a:t>Third level</a:t>
             </a:r>
           </a:p>
           <a:p>
             <a:pPr lvl="3"/>
             <a:r>
-              <a:rPr lang="en-US" smtClean="0"/>
+              <a:rPr lang="en-US"/>
               <a:t>Fourth level</a:t>
             </a:r>
           </a:p>
           <a:p>
             <a:pPr lvl="4"/>
             <a:r>
-              <a:rPr lang="en-US" smtClean="0"/>
+              <a:rPr lang="en-US"/>
               <a:t>Fifth level</a:t>
             </a:r>
             <a:endParaRPr lang="en-US" dirty="0"/>
@@ -9657,35 +9738,35 @@
           <a:p>
             <a:pPr lvl="0"/>
             <a:r>
-              <a:rPr lang="en-US" smtClean="0"/>
+              <a:rPr lang="en-US"/>
               <a:t>Click to edit text styles</a:t>
             </a:r>
           </a:p>
           <a:p>
             <a:pPr lvl="1"/>
             <a:r>
-              <a:rPr lang="en-US" smtClean="0"/>
+              <a:rPr lang="en-US"/>
               <a:t>Second level</a:t>
             </a:r>
           </a:p>
           <a:p>
             <a:pPr lvl="2"/>
             <a:r>
-              <a:rPr lang="en-US" smtClean="0"/>
+              <a:rPr lang="en-US"/>
               <a:t>Third level</a:t>
             </a:r>
           </a:p>
           <a:p>
             <a:pPr lvl="3"/>
             <a:r>
-              <a:rPr lang="en-US" smtClean="0"/>
+              <a:rPr lang="en-US"/>
               <a:t>Fourth level</a:t>
             </a:r>
           </a:p>
           <a:p>
             <a:pPr lvl="4"/>
             <a:r>
-              <a:rPr lang="en-US" smtClean="0"/>
+              <a:rPr lang="en-US"/>
               <a:t>Fifth level</a:t>
             </a:r>
             <a:endParaRPr lang="en-US" dirty="0"/>
@@ -10183,7 +10264,7 @@
           </a:lstStyle>
           <a:p>
             <a:r>
-              <a:rPr lang="en-US" smtClean="0"/>
+              <a:rPr lang="en-US"/>
               <a:t>Click icon to add picture</a:t>
             </a:r>
             <a:endParaRPr lang="en-US" dirty="0"/>
@@ -10216,7 +10297,7 @@
           <a:lstStyle/>
           <a:p>
             <a:r>
-              <a:rPr lang="en-US" noProof="0" smtClean="0"/>
+              <a:rPr lang="en-US" noProof="0"/>
               <a:t>Click to edit Master title style</a:t>
             </a:r>
             <a:endParaRPr lang="en-US" noProof="0" dirty="0"/>
@@ -10372,21 +10453,21 @@
           <a:p>
             <a:pPr lvl="0"/>
             <a:r>
-              <a:rPr lang="en-US" smtClean="0"/>
+              <a:rPr lang="en-US"/>
               <a:t>Click to edit text styles</a:t>
             </a:r>
           </a:p>
           <a:p>
             <a:pPr lvl="1"/>
             <a:r>
-              <a:rPr lang="en-US" smtClean="0"/>
+              <a:rPr lang="en-US"/>
               <a:t>Second level</a:t>
             </a:r>
           </a:p>
           <a:p>
             <a:pPr lvl="2"/>
             <a:r>
-              <a:rPr lang="en-US" smtClean="0"/>
+              <a:rPr lang="en-US"/>
               <a:t>Third level</a:t>
             </a:r>
             <a:endParaRPr lang="en-US" dirty="0"/>
@@ -10950,35 +11031,35 @@
           <a:p>
             <a:pPr lvl="0"/>
             <a:r>
-              <a:rPr lang="en-US" smtClean="0"/>
+              <a:rPr lang="en-US"/>
               <a:t>Click to edit Master text styles</a:t>
             </a:r>
           </a:p>
           <a:p>
             <a:pPr lvl="1"/>
             <a:r>
-              <a:rPr lang="en-US" smtClean="0"/>
+              <a:rPr lang="en-US"/>
               <a:t>Second level</a:t>
             </a:r>
           </a:p>
           <a:p>
             <a:pPr lvl="2"/>
             <a:r>
-              <a:rPr lang="en-US" smtClean="0"/>
+              <a:rPr lang="en-US"/>
               <a:t>Third level</a:t>
             </a:r>
           </a:p>
           <a:p>
             <a:pPr lvl="3"/>
             <a:r>
-              <a:rPr lang="en-US" smtClean="0"/>
+              <a:rPr lang="en-US"/>
               <a:t>Fourth level</a:t>
             </a:r>
           </a:p>
           <a:p>
             <a:pPr lvl="4"/>
             <a:r>
-              <a:rPr lang="en-US" smtClean="0"/>
+              <a:rPr lang="en-US"/>
               <a:t>Fifth level</a:t>
             </a:r>
             <a:endParaRPr lang="en-US" dirty="0"/>
@@ -11056,7 +11137,7 @@
           <a:lstStyle/>
           <a:p>
             <a:r>
-              <a:rPr lang="en-US" noProof="0" smtClean="0"/>
+              <a:rPr lang="en-US" noProof="0"/>
               <a:t>Click to edit Master title style</a:t>
             </a:r>
             <a:endParaRPr lang="en-US" noProof="0" dirty="0"/>
@@ -11100,7 +11181,7 @@
           </a:lstStyle>
           <a:p>
             <a:r>
-              <a:rPr lang="en-US" smtClean="0"/>
+              <a:rPr lang="en-US"/>
               <a:t>Text</a:t>
             </a:r>
             <a:endParaRPr lang="en-US" dirty="0"/>
@@ -11471,13 +11552,6 @@
   <p:clrMapOvr>
     <a:masterClrMapping/>
   </p:clrMapOvr>
-  <p:timing>
-    <p:tnLst>
-      <p:par>
-        <p:cTn id="1" dur="indefinite" restart="never" nodeType="tmRoot"/>
-      </p:par>
-    </p:tnLst>
-  </p:timing>
 </p:sldLayout>
 </file>
 
@@ -11593,7 +11667,7 @@
           <a:lstStyle/>
           <a:p>
             <a:r>
-              <a:rPr lang="en-US" noProof="0" smtClean="0"/>
+              <a:rPr lang="en-US" noProof="0"/>
               <a:t>Click to edit Master title style</a:t>
             </a:r>
             <a:endParaRPr lang="en-US" noProof="0" dirty="0"/>
@@ -11749,35 +11823,35 @@
           <a:p>
             <a:pPr lvl="0"/>
             <a:r>
-              <a:rPr lang="en-US" smtClean="0"/>
+              <a:rPr lang="en-US"/>
               <a:t>Click to edit Master text styles</a:t>
             </a:r>
           </a:p>
           <a:p>
             <a:pPr lvl="1"/>
             <a:r>
-              <a:rPr lang="en-US" smtClean="0"/>
+              <a:rPr lang="en-US"/>
               <a:t>Second level</a:t>
             </a:r>
           </a:p>
           <a:p>
             <a:pPr lvl="2"/>
             <a:r>
-              <a:rPr lang="en-US" smtClean="0"/>
+              <a:rPr lang="en-US"/>
               <a:t>Third level</a:t>
             </a:r>
           </a:p>
           <a:p>
             <a:pPr lvl="3"/>
             <a:r>
-              <a:rPr lang="en-US" smtClean="0"/>
+              <a:rPr lang="en-US"/>
               <a:t>Fourth level</a:t>
             </a:r>
           </a:p>
           <a:p>
             <a:pPr lvl="4"/>
             <a:r>
-              <a:rPr lang="en-US" smtClean="0"/>
+              <a:rPr lang="en-US"/>
               <a:t>Fifth level</a:t>
             </a:r>
             <a:endParaRPr lang="en-US" dirty="0"/>
@@ -11933,35 +12007,35 @@
           <a:p>
             <a:pPr lvl="0"/>
             <a:r>
-              <a:rPr lang="en-US" smtClean="0"/>
+              <a:rPr lang="en-US"/>
               <a:t>Click to edit Master text styles</a:t>
             </a:r>
           </a:p>
           <a:p>
             <a:pPr lvl="1"/>
             <a:r>
-              <a:rPr lang="en-US" smtClean="0"/>
+              <a:rPr lang="en-US"/>
               <a:t>Second level</a:t>
             </a:r>
           </a:p>
           <a:p>
             <a:pPr lvl="2"/>
             <a:r>
-              <a:rPr lang="en-US" smtClean="0"/>
+              <a:rPr lang="en-US"/>
               <a:t>Third level</a:t>
             </a:r>
           </a:p>
           <a:p>
             <a:pPr lvl="3"/>
             <a:r>
-              <a:rPr lang="en-US" smtClean="0"/>
+              <a:rPr lang="en-US"/>
               <a:t>Fourth level</a:t>
             </a:r>
           </a:p>
           <a:p>
             <a:pPr lvl="4"/>
             <a:r>
-              <a:rPr lang="en-US" smtClean="0"/>
+              <a:rPr lang="en-US"/>
               <a:t>Fifth level</a:t>
             </a:r>
             <a:endParaRPr lang="en-US" dirty="0"/>
@@ -12117,14 +12191,14 @@
           <a:p>
             <a:pPr lvl="0"/>
             <a:r>
-              <a:rPr lang="en-US" smtClean="0"/>
+              <a:rPr lang="en-US"/>
               <a:t>Click to edit Master text styles</a:t>
             </a:r>
           </a:p>
           <a:p>
             <a:pPr lvl="1"/>
             <a:r>
-              <a:rPr lang="en-US" smtClean="0"/>
+              <a:rPr lang="en-US"/>
               <a:t>Second level</a:t>
             </a:r>
           </a:p>
@@ -12494,13 +12568,6 @@
   <p:clrMapOvr>
     <a:masterClrMapping/>
   </p:clrMapOvr>
-  <p:timing>
-    <p:tnLst>
-      <p:par>
-        <p:cTn id="1" dur="indefinite" restart="never" nodeType="tmRoot"/>
-      </p:par>
-    </p:tnLst>
-  </p:timing>
 </p:sldLayout>
 </file>
 
@@ -12656,10 +12723,10 @@
           <a:p>
             <a:pPr lvl="0"/>
             <a:r>
-              <a:rPr lang="en-US" noProof="0" smtClean="0"/>
+              <a:rPr lang="en-US" noProof="0"/>
               <a:t>Click to enter text</a:t>
             </a:r>
-            <a:endParaRPr lang="en-US" noProof="0" dirty="0" smtClean="0"/>
+            <a:endParaRPr lang="en-US" noProof="0" dirty="0"/>
           </a:p>
         </p:txBody>
       </p:sp>
@@ -12701,7 +12768,7 @@
           </a:lstStyle>
           <a:p>
             <a:r>
-              <a:rPr lang="en-US" smtClean="0"/>
+              <a:rPr lang="en-US"/>
               <a:t>Click icon to add picture</a:t>
             </a:r>
             <a:endParaRPr lang="en-US" dirty="0"/>
@@ -12734,7 +12801,7 @@
           <a:lstStyle/>
           <a:p>
             <a:r>
-              <a:rPr lang="en-US" noProof="0" smtClean="0"/>
+              <a:rPr lang="en-US" noProof="0"/>
               <a:t>Click to edit Master title style</a:t>
             </a:r>
             <a:endParaRPr lang="en-US" noProof="0" dirty="0"/>
@@ -19874,7 +19941,7 @@
           </a:lstStyle>
           <a:p>
             <a:r>
-              <a:rPr lang="en-US" noProof="0" smtClean="0"/>
+              <a:rPr lang="en-US" noProof="0"/>
               <a:t>Click to edit Master title style</a:t>
             </a:r>
             <a:endParaRPr lang="en-US" noProof="0" dirty="0"/>
@@ -26610,7 +26677,7 @@
           </a:lstStyle>
           <a:p>
             <a:r>
-              <a:rPr lang="en-US" noProof="0" smtClean="0"/>
+              <a:rPr lang="en-US" noProof="0"/>
               <a:t>Thank you</a:t>
             </a:r>
             <a:endParaRPr lang="en-US" noProof="0" dirty="0"/>
@@ -26733,10 +26800,9 @@
           </a:lstStyle>
           <a:p>
             <a:r>
-              <a:rPr lang="en-US" noProof="0" dirty="0" smtClean="0"/>
+              <a:rPr lang="en-US" noProof="0" dirty="0"/>
               <a:t>Click to edit Master subtitle style</a:t>
             </a:r>
-            <a:endParaRPr lang="en-US" noProof="0" dirty="0"/>
           </a:p>
         </p:txBody>
       </p:sp>
@@ -27268,7 +27334,7 @@
           <a:lstStyle/>
           <a:p>
             <a:r>
-              <a:rPr lang="en-US" noProof="0" smtClean="0"/>
+              <a:rPr lang="en-US" noProof="0"/>
               <a:t>Click to edit Master title style</a:t>
             </a:r>
             <a:endParaRPr lang="en-US" noProof="0" dirty="0"/>
@@ -27421,35 +27487,35 @@
           <a:p>
             <a:pPr lvl="0"/>
             <a:r>
-              <a:rPr lang="en-US" smtClean="0"/>
+              <a:rPr lang="en-US"/>
               <a:t>Click to edit Master text styles</a:t>
             </a:r>
           </a:p>
           <a:p>
             <a:pPr lvl="1"/>
             <a:r>
-              <a:rPr lang="en-US" smtClean="0"/>
+              <a:rPr lang="en-US"/>
               <a:t>Second level</a:t>
             </a:r>
           </a:p>
           <a:p>
             <a:pPr lvl="2"/>
             <a:r>
-              <a:rPr lang="en-US" smtClean="0"/>
+              <a:rPr lang="en-US"/>
               <a:t>Third level</a:t>
             </a:r>
           </a:p>
           <a:p>
             <a:pPr lvl="3"/>
             <a:r>
-              <a:rPr lang="en-US" smtClean="0"/>
+              <a:rPr lang="en-US"/>
               <a:t>Fourth level</a:t>
             </a:r>
           </a:p>
           <a:p>
             <a:pPr lvl="4"/>
             <a:r>
-              <a:rPr lang="en-US" smtClean="0"/>
+              <a:rPr lang="en-US"/>
               <a:t>Fifth level</a:t>
             </a:r>
             <a:endParaRPr lang="en-US" dirty="0"/>
@@ -27865,13 +27931,6 @@
   <p:clrMapOvr>
     <a:masterClrMapping/>
   </p:clrMapOvr>
-  <p:timing>
-    <p:tnLst>
-      <p:par>
-        <p:cTn id="1" dur="indefinite" restart="never" nodeType="tmRoot"/>
-      </p:par>
-    </p:tnLst>
-  </p:timing>
 </p:sldLayout>
 </file>
 
@@ -27987,7 +28046,7 @@
           <a:lstStyle/>
           <a:p>
             <a:r>
-              <a:rPr lang="en-US" noProof="0" smtClean="0"/>
+              <a:rPr lang="en-US" noProof="0"/>
               <a:t>Click to edit Master title style</a:t>
             </a:r>
             <a:endParaRPr lang="en-US" noProof="0" dirty="0"/>
@@ -28140,35 +28199,35 @@
           <a:p>
             <a:pPr lvl="0"/>
             <a:r>
-              <a:rPr lang="en-US" smtClean="0"/>
+              <a:rPr lang="en-US"/>
               <a:t>Click to edit Master text styles</a:t>
             </a:r>
           </a:p>
           <a:p>
             <a:pPr lvl="1"/>
             <a:r>
-              <a:rPr lang="en-US" smtClean="0"/>
+              <a:rPr lang="en-US"/>
               <a:t>Second level</a:t>
             </a:r>
           </a:p>
           <a:p>
             <a:pPr lvl="2"/>
             <a:r>
-              <a:rPr lang="en-US" smtClean="0"/>
+              <a:rPr lang="en-US"/>
               <a:t>Third level</a:t>
             </a:r>
           </a:p>
           <a:p>
             <a:pPr lvl="3"/>
             <a:r>
-              <a:rPr lang="en-US" smtClean="0"/>
+              <a:rPr lang="en-US"/>
               <a:t>Fourth level</a:t>
             </a:r>
           </a:p>
           <a:p>
             <a:pPr lvl="4"/>
             <a:r>
-              <a:rPr lang="en-US" smtClean="0"/>
+              <a:rPr lang="en-US"/>
               <a:t>Fifth level</a:t>
             </a:r>
             <a:endParaRPr lang="en-US" dirty="0"/>
@@ -28320,35 +28379,35 @@
           <a:p>
             <a:pPr lvl="0"/>
             <a:r>
-              <a:rPr lang="en-US" smtClean="0"/>
+              <a:rPr lang="en-US"/>
               <a:t>Click to edit Master text styles</a:t>
             </a:r>
           </a:p>
           <a:p>
             <a:pPr lvl="1"/>
             <a:r>
-              <a:rPr lang="en-US" smtClean="0"/>
+              <a:rPr lang="en-US"/>
               <a:t>Second level</a:t>
             </a:r>
           </a:p>
           <a:p>
             <a:pPr lvl="2"/>
             <a:r>
-              <a:rPr lang="en-US" smtClean="0"/>
+              <a:rPr lang="en-US"/>
               <a:t>Third level</a:t>
             </a:r>
           </a:p>
           <a:p>
             <a:pPr lvl="3"/>
             <a:r>
-              <a:rPr lang="en-US" smtClean="0"/>
+              <a:rPr lang="en-US"/>
               <a:t>Fourth level</a:t>
             </a:r>
           </a:p>
           <a:p>
             <a:pPr lvl="4"/>
             <a:r>
-              <a:rPr lang="en-US" smtClean="0"/>
+              <a:rPr lang="en-US"/>
               <a:t>Fifth level</a:t>
             </a:r>
             <a:endParaRPr lang="en-US" dirty="0"/>
@@ -28719,13 +28778,6 @@
   <p:clrMapOvr>
     <a:masterClrMapping/>
   </p:clrMapOvr>
-  <p:timing>
-    <p:tnLst>
-      <p:par>
-        <p:cTn id="1" dur="indefinite" restart="never" nodeType="tmRoot"/>
-      </p:par>
-    </p:tnLst>
-  </p:timing>
 </p:sldLayout>
 </file>
 
@@ -28796,7 +28848,7 @@
           <a:lstStyle/>
           <a:p>
             <a:r>
-              <a:rPr lang="en-US" noProof="0" smtClean="0"/>
+              <a:rPr lang="en-US" noProof="0"/>
               <a:t>Click to edit Master title style</a:t>
             </a:r>
             <a:endParaRPr lang="en-US" noProof="0" dirty="0"/>
@@ -29212,13 +29264,6 @@
   <p:clrMapOvr>
     <a:masterClrMapping/>
   </p:clrMapOvr>
-  <p:timing>
-    <p:tnLst>
-      <p:par>
-        <p:cTn id="1" dur="indefinite" restart="never" nodeType="tmRoot"/>
-      </p:par>
-    </p:tnLst>
-  </p:timing>
 </p:sldLayout>
 </file>
 
@@ -29334,7 +29379,7 @@
           <a:lstStyle/>
           <a:p>
             <a:r>
-              <a:rPr lang="en-US" noProof="0" smtClean="0"/>
+              <a:rPr lang="en-US" noProof="0"/>
               <a:t>Click to edit Master title style</a:t>
             </a:r>
             <a:endParaRPr lang="en-US" noProof="0" dirty="0"/>
@@ -29488,35 +29533,35 @@
           <a:p>
             <a:pPr lvl="0"/>
             <a:r>
-              <a:rPr lang="en-US" smtClean="0"/>
+              <a:rPr lang="en-US"/>
               <a:t>Click to edit Master text styles</a:t>
             </a:r>
           </a:p>
           <a:p>
             <a:pPr lvl="1"/>
             <a:r>
-              <a:rPr lang="en-US" smtClean="0"/>
+              <a:rPr lang="en-US"/>
               <a:t>Second level</a:t>
             </a:r>
           </a:p>
           <a:p>
             <a:pPr lvl="2"/>
             <a:r>
-              <a:rPr lang="en-US" smtClean="0"/>
+              <a:rPr lang="en-US"/>
               <a:t>Third level</a:t>
             </a:r>
           </a:p>
           <a:p>
             <a:pPr lvl="3"/>
             <a:r>
-              <a:rPr lang="en-US" smtClean="0"/>
+              <a:rPr lang="en-US"/>
               <a:t>Fourth level</a:t>
             </a:r>
           </a:p>
           <a:p>
             <a:pPr lvl="4"/>
             <a:r>
-              <a:rPr lang="en-US" smtClean="0"/>
+              <a:rPr lang="en-US"/>
               <a:t>Fifth level</a:t>
             </a:r>
             <a:endParaRPr lang="en-US" dirty="0"/>
@@ -29887,13 +29932,6 @@
   <p:clrMapOvr>
     <a:masterClrMapping/>
   </p:clrMapOvr>
-  <p:timing>
-    <p:tnLst>
-      <p:par>
-        <p:cTn id="1" dur="indefinite" restart="never" nodeType="tmRoot"/>
-      </p:par>
-    </p:tnLst>
-  </p:timing>
 </p:sldLayout>
 </file>
 
@@ -29964,7 +30002,7 @@
           <a:lstStyle/>
           <a:p>
             <a:r>
-              <a:rPr lang="en-US" noProof="0" smtClean="0"/>
+              <a:rPr lang="en-US" noProof="0"/>
               <a:t>Click to edit Master title style</a:t>
             </a:r>
             <a:endParaRPr lang="en-US" noProof="0" dirty="0"/>
@@ -30165,35 +30203,35 @@
           <a:p>
             <a:pPr lvl="0"/>
             <a:r>
-              <a:rPr lang="en-US" smtClean="0"/>
+              <a:rPr lang="en-US"/>
               <a:t>Click to edit Master text styles</a:t>
             </a:r>
           </a:p>
           <a:p>
             <a:pPr lvl="1"/>
             <a:r>
-              <a:rPr lang="en-US" smtClean="0"/>
+              <a:rPr lang="en-US"/>
               <a:t>Second level</a:t>
             </a:r>
           </a:p>
           <a:p>
             <a:pPr lvl="2"/>
             <a:r>
-              <a:rPr lang="en-US" smtClean="0"/>
+              <a:rPr lang="en-US"/>
               <a:t>Third level</a:t>
             </a:r>
           </a:p>
           <a:p>
             <a:pPr lvl="3"/>
             <a:r>
-              <a:rPr lang="en-US" smtClean="0"/>
+              <a:rPr lang="en-US"/>
               <a:t>Fourth level</a:t>
             </a:r>
           </a:p>
           <a:p>
             <a:pPr lvl="4"/>
             <a:r>
-              <a:rPr lang="en-US" smtClean="0"/>
+              <a:rPr lang="en-US"/>
               <a:t>Fifth level</a:t>
             </a:r>
             <a:endParaRPr lang="en-US" dirty="0"/>
@@ -30349,35 +30387,35 @@
           <a:p>
             <a:pPr lvl="0"/>
             <a:r>
-              <a:rPr lang="en-US" smtClean="0"/>
+              <a:rPr lang="en-US"/>
               <a:t>Click to edit Master text styles</a:t>
             </a:r>
           </a:p>
           <a:p>
             <a:pPr lvl="1"/>
             <a:r>
-              <a:rPr lang="en-US" smtClean="0"/>
+              <a:rPr lang="en-US"/>
               <a:t>Second level</a:t>
             </a:r>
           </a:p>
           <a:p>
             <a:pPr lvl="2"/>
             <a:r>
-              <a:rPr lang="en-US" smtClean="0"/>
+              <a:rPr lang="en-US"/>
               <a:t>Third level</a:t>
             </a:r>
           </a:p>
           <a:p>
             <a:pPr lvl="3"/>
             <a:r>
-              <a:rPr lang="en-US" smtClean="0"/>
+              <a:rPr lang="en-US"/>
               <a:t>Fourth level</a:t>
             </a:r>
           </a:p>
           <a:p>
             <a:pPr lvl="4"/>
             <a:r>
-              <a:rPr lang="en-US" smtClean="0"/>
+              <a:rPr lang="en-US"/>
               <a:t>Fifth level</a:t>
             </a:r>
             <a:endParaRPr lang="en-US" dirty="0"/>
@@ -30748,13 +30786,6 @@
   <p:clrMapOvr>
     <a:masterClrMapping/>
   </p:clrMapOvr>
-  <p:timing>
-    <p:tnLst>
-      <p:par>
-        <p:cTn id="1" dur="indefinite" restart="never" nodeType="tmRoot"/>
-      </p:par>
-    </p:tnLst>
-  </p:timing>
 </p:sldLayout>
 </file>
 
@@ -30870,7 +30901,7 @@
           <a:lstStyle/>
           <a:p>
             <a:r>
-              <a:rPr lang="en-US" noProof="0" smtClean="0"/>
+              <a:rPr lang="en-US" noProof="0"/>
               <a:t>Click to edit Master title style</a:t>
             </a:r>
             <a:endParaRPr lang="en-US" noProof="0" dirty="0"/>
@@ -31026,35 +31057,35 @@
           <a:p>
             <a:pPr lvl="0"/>
             <a:r>
-              <a:rPr lang="en-US" smtClean="0"/>
+              <a:rPr lang="en-US"/>
               <a:t>Click to edit Master text styles</a:t>
             </a:r>
           </a:p>
           <a:p>
             <a:pPr lvl="1"/>
             <a:r>
-              <a:rPr lang="en-US" smtClean="0"/>
+              <a:rPr lang="en-US"/>
               <a:t>Second level</a:t>
             </a:r>
           </a:p>
           <a:p>
             <a:pPr lvl="2"/>
             <a:r>
-              <a:rPr lang="en-US" smtClean="0"/>
+              <a:rPr lang="en-US"/>
               <a:t>Third level</a:t>
             </a:r>
           </a:p>
           <a:p>
             <a:pPr lvl="3"/>
             <a:r>
-              <a:rPr lang="en-US" smtClean="0"/>
+              <a:rPr lang="en-US"/>
               <a:t>Fourth level</a:t>
             </a:r>
           </a:p>
           <a:p>
             <a:pPr lvl="4"/>
             <a:r>
-              <a:rPr lang="en-US" smtClean="0"/>
+              <a:rPr lang="en-US"/>
               <a:t>Fifth level</a:t>
             </a:r>
             <a:endParaRPr lang="en-US" dirty="0"/>
@@ -31210,35 +31241,35 @@
           <a:p>
             <a:pPr lvl="0"/>
             <a:r>
-              <a:rPr lang="en-US" smtClean="0"/>
+              <a:rPr lang="en-US"/>
               <a:t>Click to edit Master text styles</a:t>
             </a:r>
           </a:p>
           <a:p>
             <a:pPr lvl="1"/>
             <a:r>
-              <a:rPr lang="en-US" smtClean="0"/>
+              <a:rPr lang="en-US"/>
               <a:t>Second level</a:t>
             </a:r>
           </a:p>
           <a:p>
             <a:pPr lvl="2"/>
             <a:r>
-              <a:rPr lang="en-US" smtClean="0"/>
+              <a:rPr lang="en-US"/>
               <a:t>Third level</a:t>
             </a:r>
           </a:p>
           <a:p>
             <a:pPr lvl="3"/>
             <a:r>
-              <a:rPr lang="en-US" smtClean="0"/>
+              <a:rPr lang="en-US"/>
               <a:t>Fourth level</a:t>
             </a:r>
           </a:p>
           <a:p>
             <a:pPr lvl="4"/>
             <a:r>
-              <a:rPr lang="en-US" smtClean="0"/>
+              <a:rPr lang="en-US"/>
               <a:t>Fifth level</a:t>
             </a:r>
             <a:endParaRPr lang="en-US" dirty="0"/>
@@ -31609,13 +31640,6 @@
   <p:clrMapOvr>
     <a:masterClrMapping/>
   </p:clrMapOvr>
-  <p:timing>
-    <p:tnLst>
-      <p:par>
-        <p:cTn id="1" dur="indefinite" restart="never" nodeType="tmRoot"/>
-      </p:par>
-    </p:tnLst>
-  </p:timing>
 </p:sldLayout>
 </file>
 
@@ -38364,7 +38388,7 @@
           </a:lstStyle>
           <a:p>
             <a:r>
-              <a:rPr lang="en-US" noProof="0" smtClean="0"/>
+              <a:rPr lang="en-US" noProof="0"/>
               <a:t>Click to edit Master title style</a:t>
             </a:r>
             <a:endParaRPr lang="en-US" noProof="0" dirty="0"/>
@@ -38487,7 +38511,7 @@
           </a:lstStyle>
           <a:p>
             <a:r>
-              <a:rPr lang="en-US" noProof="0" smtClean="0"/>
+              <a:rPr lang="en-US" noProof="0"/>
               <a:t>Click to edit Master subtitle style</a:t>
             </a:r>
             <a:endParaRPr lang="en-US" noProof="0" dirty="0"/>
@@ -38499,13 +38523,6 @@
   <p:clrMapOvr>
     <a:masterClrMapping/>
   </p:clrMapOvr>
-  <p:timing>
-    <p:tnLst>
-      <p:par>
-        <p:cTn id="1" dur="indefinite" restart="never" nodeType="tmRoot"/>
-      </p:par>
-    </p:tnLst>
-  </p:timing>
 </p:sldLayout>
 </file>
 
@@ -45227,7 +45244,7 @@
           </a:lstStyle>
           <a:p>
             <a:r>
-              <a:rPr lang="en-US" noProof="0" smtClean="0"/>
+              <a:rPr lang="en-US" noProof="0"/>
               <a:t>Click to edit Master title style</a:t>
             </a:r>
             <a:endParaRPr lang="en-US" noProof="0" dirty="0"/>
@@ -45350,7 +45367,7 @@
           </a:lstStyle>
           <a:p>
             <a:r>
-              <a:rPr lang="en-US" noProof="0" smtClean="0"/>
+              <a:rPr lang="en-US" noProof="0"/>
               <a:t>Click to edit Master subtitle style</a:t>
             </a:r>
             <a:endParaRPr lang="en-US" noProof="0" dirty="0"/>
@@ -45362,13 +45379,6 @@
   <p:clrMapOvr>
     <a:masterClrMapping/>
   </p:clrMapOvr>
-  <p:timing>
-    <p:tnLst>
-      <p:par>
-        <p:cTn id="1" dur="indefinite" restart="never" nodeType="tmRoot"/>
-      </p:par>
-    </p:tnLst>
-  </p:timing>
 </p:sldLayout>
 </file>
 
@@ -45420,7 +45430,7 @@
           <a:lstStyle/>
           <a:p>
             <a:r>
-              <a:rPr lang="en-US" noProof="0" smtClean="0"/>
+              <a:rPr lang="en-US" noProof="0"/>
               <a:t>Click to edit Master title style</a:t>
             </a:r>
             <a:endParaRPr lang="en-US" noProof="0" dirty="0"/>
@@ -45737,14 +45747,13 @@
           <a:lstStyle/>
           <a:p>
             <a:r>
-              <a:rPr lang="en-US" dirty="0" err="1" smtClean="0"/>
+              <a:rPr lang="en-US" dirty="0" err="1"/>
               <a:t>Devoxx</a:t>
             </a:r>
             <a:r>
-              <a:rPr lang="en-US" dirty="0" smtClean="0"/>
+              <a:rPr lang="en-US" dirty="0"/>
               <a:t> 2017 </a:t>
             </a:r>
-            <a:endParaRPr lang="en-US" dirty="0"/>
           </a:p>
         </p:txBody>
       </p:sp>
@@ -45771,20 +45780,18 @@
           <a:lstStyle/>
           <a:p>
             <a:r>
-              <a:rPr lang="en-GB" dirty="0" smtClean="0"/>
+              <a:rPr lang="en-GB" dirty="0"/>
               <a:t>Ronald Kooistra &amp; Koos Drost</a:t>
             </a:r>
-            <a:endParaRPr lang="en-GB" dirty="0" smtClean="0"/>
           </a:p>
           <a:p>
             <a:r>
-              <a:rPr lang="en-GB" dirty="0" smtClean="0"/>
+              <a:rPr lang="en-GB" dirty="0"/>
               <a:t>29-11-2017</a:t>
             </a:r>
-            <a:endParaRPr lang="en-GB" dirty="0" smtClean="0"/>
           </a:p>
           <a:p>
-            <a:endParaRPr lang="en-US" dirty="0" smtClean="0"/>
+            <a:endParaRPr lang="en-US" dirty="0"/>
           </a:p>
         </p:txBody>
       </p:sp>
@@ -45794,13 +45801,333 @@
     <a:masterClrMapping/>
   </p:clrMapOvr>
   <p:transition/>
-  <p:timing>
-    <p:tnLst>
-      <p:par>
-        <p:cTn id="1" dur="indefinite" restart="never" nodeType="tmRoot"/>
-      </p:par>
-    </p:tnLst>
-  </p:timing>
+</p:sld>
+</file>
+
+<file path=ppt/slides/slide10.xml><?xml version="1.0" encoding="utf-8"?>
+<p:sld xmlns:a="http://schemas.openxmlformats.org/drawingml/2006/main" xmlns:r="http://schemas.openxmlformats.org/officeDocument/2006/relationships" xmlns:p="http://schemas.openxmlformats.org/presentationml/2006/main">
+  <p:cSld>
+    <p:spTree>
+      <p:nvGrpSpPr>
+        <p:cNvPr id="1" name=""/>
+        <p:cNvGrpSpPr/>
+        <p:nvPr/>
+      </p:nvGrpSpPr>
+      <p:grpSpPr>
+        <a:xfrm>
+          <a:off x="0" y="0"/>
+          <a:ext cx="0" cy="0"/>
+          <a:chOff x="0" y="0"/>
+          <a:chExt cx="0" cy="0"/>
+        </a:xfrm>
+      </p:grpSpPr>
+      <p:sp>
+        <p:nvSpPr>
+          <p:cNvPr id="2" name="Title 1"/>
+          <p:cNvSpPr>
+            <a:spLocks noGrp="1"/>
+          </p:cNvSpPr>
+          <p:nvPr>
+            <p:ph type="title"/>
+          </p:nvPr>
+        </p:nvSpPr>
+        <p:spPr/>
+        <p:txBody>
+          <a:bodyPr/>
+          <a:lstStyle/>
+          <a:p>
+            <a:r>
+              <a:rPr lang="en-US" dirty="0"/>
+              <a:t>Online content</a:t>
+            </a:r>
+          </a:p>
+        </p:txBody>
+      </p:sp>
+      <p:sp>
+        <p:nvSpPr>
+          <p:cNvPr id="5" name="Slide Number Placeholder 4"/>
+          <p:cNvSpPr>
+            <a:spLocks noGrp="1"/>
+          </p:cNvSpPr>
+          <p:nvPr>
+            <p:ph type="sldNum" sz="quarter" idx="12"/>
+          </p:nvPr>
+        </p:nvSpPr>
+        <p:spPr/>
+        <p:txBody>
+          <a:bodyPr/>
+          <a:lstStyle/>
+          <a:p>
+            <a:fld id="{525A3C56-E491-49B2-93F3-63532DF516BC}" type="slidenum">
+              <a:rPr lang="en-US" smtClean="0"/>
+              <a:pPr/>
+              <a:t>10</a:t>
+            </a:fld>
+            <a:endParaRPr lang="en-US" dirty="0"/>
+          </a:p>
+        </p:txBody>
+      </p:sp>
+      <p:sp>
+        <p:nvSpPr>
+          <p:cNvPr id="4" name="Tijdelijke aanduiding voor inhoud 3"/>
+          <p:cNvSpPr>
+            <a:spLocks noGrp="1"/>
+          </p:cNvSpPr>
+          <p:nvPr>
+            <p:ph sz="quarter" idx="17"/>
+          </p:nvPr>
+        </p:nvSpPr>
+        <p:spPr>
+          <a:xfrm>
+            <a:off x="449264" y="1266825"/>
+            <a:ext cx="8336010" cy="4886325"/>
+          </a:xfrm>
+        </p:spPr>
+        <p:txBody>
+          <a:bodyPr/>
+          <a:lstStyle/>
+          <a:p>
+            <a:r>
+              <a:rPr lang="nl-NL" dirty="0"/>
+              <a:t>Alle links nog even kort van Koos en Ronald</a:t>
+            </a:r>
+            <a:endParaRPr lang="nl-NL" dirty="0">
+              <a:hlinkClick r:id="rId3"/>
+            </a:endParaRPr>
+          </a:p>
+          <a:p>
+            <a:endParaRPr lang="nl-NL" dirty="0">
+              <a:hlinkClick r:id="rId3"/>
+            </a:endParaRPr>
+          </a:p>
+          <a:p>
+            <a:pPr marL="342900" indent="-342900">
+              <a:buFontTx/>
+              <a:buChar char="-"/>
+            </a:pPr>
+            <a:r>
+              <a:rPr lang="nl-NL" dirty="0" err="1">
+                <a:hlinkClick r:id="rId3"/>
+              </a:rPr>
+              <a:t>Youtube</a:t>
+            </a:r>
+            <a:r>
+              <a:rPr lang="nl-NL" dirty="0">
+                <a:hlinkClick r:id="rId3"/>
+              </a:rPr>
+              <a:t> </a:t>
+            </a:r>
+            <a:r>
+              <a:rPr lang="nl-NL" dirty="0" err="1">
+                <a:hlinkClick r:id="rId3"/>
+              </a:rPr>
+              <a:t>channel</a:t>
+            </a:r>
+            <a:r>
+              <a:rPr lang="nl-NL" dirty="0">
+                <a:hlinkClick r:id="rId3"/>
+              </a:rPr>
+              <a:t> </a:t>
+            </a:r>
+            <a:r>
+              <a:rPr lang="nl-NL" dirty="0" err="1">
+                <a:hlinkClick r:id="rId3"/>
+              </a:rPr>
+              <a:t>Devoxx</a:t>
+            </a:r>
+            <a:r>
+              <a:rPr lang="nl-NL" dirty="0">
+                <a:hlinkClick r:id="rId3"/>
+              </a:rPr>
+              <a:t> 2017</a:t>
+            </a:r>
+            <a:r>
+              <a:rPr lang="nl-NL" dirty="0"/>
+              <a:t> </a:t>
+            </a:r>
+          </a:p>
+          <a:p>
+            <a:r>
+              <a:rPr lang="nl-NL" dirty="0"/>
+              <a:t>	bevat alle presentaties van 2017</a:t>
+            </a:r>
+          </a:p>
+          <a:p>
+            <a:pPr marL="342900" indent="-342900">
+              <a:buFontTx/>
+              <a:buChar char="-"/>
+            </a:pPr>
+            <a:r>
+              <a:rPr lang="nl-NL" dirty="0">
+                <a:hlinkClick r:id="rId4"/>
+              </a:rPr>
+              <a:t>Top-100 </a:t>
+            </a:r>
+            <a:r>
+              <a:rPr lang="nl-NL" dirty="0" err="1">
+                <a:hlinkClick r:id="rId4"/>
+              </a:rPr>
+              <a:t>Devoxx</a:t>
+            </a:r>
+            <a:r>
+              <a:rPr lang="nl-NL" dirty="0">
+                <a:hlinkClick r:id="rId4"/>
+              </a:rPr>
+              <a:t> 2017</a:t>
+            </a:r>
+            <a:endParaRPr lang="nl-NL" dirty="0"/>
+          </a:p>
+          <a:p>
+            <a:pPr lvl="2" indent="0">
+              <a:buNone/>
+            </a:pPr>
+            <a:r>
+              <a:rPr lang="nl-NL" dirty="0"/>
+              <a:t>	top-100 op basis van de rating van het publiek (inclusief links)</a:t>
+            </a:r>
+          </a:p>
+        </p:txBody>
+      </p:sp>
+    </p:spTree>
+    <p:extLst>
+      <p:ext uri="{BB962C8B-B14F-4D97-AF65-F5344CB8AC3E}">
+        <p14:creationId xmlns:p14="http://schemas.microsoft.com/office/powerpoint/2010/main" val="2997554915"/>
+      </p:ext>
+    </p:extLst>
+  </p:cSld>
+  <p:clrMapOvr>
+    <a:masterClrMapping/>
+  </p:clrMapOvr>
+</p:sld>
+</file>
+
+<file path=ppt/slides/slide11.xml><?xml version="1.0" encoding="utf-8"?>
+<p:sld xmlns:a="http://schemas.openxmlformats.org/drawingml/2006/main" xmlns:r="http://schemas.openxmlformats.org/officeDocument/2006/relationships" xmlns:p="http://schemas.openxmlformats.org/presentationml/2006/main">
+  <p:cSld>
+    <p:spTree>
+      <p:nvGrpSpPr>
+        <p:cNvPr id="1" name=""/>
+        <p:cNvGrpSpPr/>
+        <p:nvPr/>
+      </p:nvGrpSpPr>
+      <p:grpSpPr>
+        <a:xfrm>
+          <a:off x="0" y="0"/>
+          <a:ext cx="0" cy="0"/>
+          <a:chOff x="0" y="0"/>
+          <a:chExt cx="0" cy="0"/>
+        </a:xfrm>
+      </p:grpSpPr>
+      <p:pic>
+        <p:nvPicPr>
+          <p:cNvPr id="3" name="Afbeelding 2"/>
+          <p:cNvPicPr>
+            <a:picLocks noChangeAspect="1"/>
+          </p:cNvPicPr>
+          <p:nvPr/>
+        </p:nvPicPr>
+        <p:blipFill>
+          <a:blip r:embed="rId2" cstate="print">
+            <a:extLst>
+              <a:ext uri="{28A0092B-C50C-407E-A947-70E740481C1C}">
+                <a14:useLocalDpi xmlns:a14="http://schemas.microsoft.com/office/drawing/2010/main" val="0"/>
+              </a:ext>
+            </a:extLst>
+          </a:blip>
+          <a:stretch>
+            <a:fillRect/>
+          </a:stretch>
+        </p:blipFill>
+        <p:spPr>
+          <a:xfrm>
+            <a:off x="1716259" y="1561515"/>
+            <a:ext cx="5054991" cy="3791243"/>
+          </a:xfrm>
+          <a:prstGeom prst="rect">
+            <a:avLst/>
+          </a:prstGeom>
+        </p:spPr>
+      </p:pic>
+      <p:sp>
+        <p:nvSpPr>
+          <p:cNvPr id="4" name="Tekstvak 3"/>
+          <p:cNvSpPr txBox="1"/>
+          <p:nvPr/>
+        </p:nvSpPr>
+        <p:spPr bwMode="auto">
+          <a:xfrm>
+            <a:off x="407964" y="203982"/>
+            <a:ext cx="8159262" cy="1107996"/>
+          </a:xfrm>
+          <a:prstGeom prst="rect">
+            <a:avLst/>
+          </a:prstGeom>
+          <a:noFill/>
+          <a:ln w="9525" algn="ctr">
+            <a:noFill/>
+            <a:miter lim="800000"/>
+            <a:headEnd/>
+            <a:tailEnd/>
+          </a:ln>
+          <a:effectLst/>
+        </p:spPr>
+        <p:txBody>
+          <a:bodyPr wrap="square" lIns="0" tIns="0" rIns="0" bIns="0" rtlCol="0">
+            <a:spAutoFit/>
+          </a:bodyPr>
+          <a:lstStyle/>
+          <a:p>
+            <a:r>
+              <a:rPr lang="nl-NL" dirty="0">
+                <a:cs typeface="Arial" pitchFamily="34" charset="0"/>
+              </a:rPr>
+              <a:t>Misschien even afsluiten met dat je zo snel mensen leert kennen. Samen in de kroeg staan met gelijkgestemden is gezellig en interessant . </a:t>
+            </a:r>
+          </a:p>
+          <a:p>
+            <a:r>
+              <a:rPr lang="nl-NL" dirty="0">
+                <a:cs typeface="Arial" pitchFamily="34" charset="0"/>
+              </a:rPr>
+              <a:t>Op de foto spontaan met 12 man in </a:t>
+            </a:r>
+            <a:r>
+              <a:rPr lang="nl-NL" dirty="0" err="1">
+                <a:cs typeface="Arial" pitchFamily="34" charset="0"/>
+              </a:rPr>
+              <a:t>pizzaria</a:t>
+            </a:r>
+            <a:r>
+              <a:rPr lang="nl-NL" dirty="0">
+                <a:cs typeface="Arial" pitchFamily="34" charset="0"/>
+              </a:rPr>
+              <a:t> van CGI, DUO, </a:t>
+            </a:r>
+            <a:r>
+              <a:rPr lang="nl-NL" dirty="0" err="1">
+                <a:cs typeface="Arial" pitchFamily="34" charset="0"/>
+              </a:rPr>
+              <a:t>Maven</a:t>
+            </a:r>
+            <a:r>
+              <a:rPr lang="nl-NL" dirty="0">
+                <a:cs typeface="Arial" pitchFamily="34" charset="0"/>
+              </a:rPr>
+              <a:t> + (waar waren die achtersten van?)</a:t>
+            </a:r>
+          </a:p>
+        </p:txBody>
+      </p:sp>
+    </p:spTree>
+    <p:extLst>
+      <p:ext uri="{BB962C8B-B14F-4D97-AF65-F5344CB8AC3E}">
+        <p14:creationId xmlns:p14="http://schemas.microsoft.com/office/powerpoint/2010/main" val="3014988699"/>
+      </p:ext>
+    </p:extLst>
+  </p:cSld>
+  <p:clrMapOvr>
+    <a:masterClrMapping/>
+  </p:clrMapOvr>
 </p:sld>
 </file>
 
@@ -45837,14 +46164,13 @@
           <a:lstStyle/>
           <a:p>
             <a:r>
-              <a:rPr lang="en-US" dirty="0" err="1" smtClean="0"/>
+              <a:rPr lang="en-US" dirty="0" err="1"/>
               <a:t>Devoxx</a:t>
             </a:r>
             <a:r>
-              <a:rPr lang="en-US" dirty="0" smtClean="0"/>
+              <a:rPr lang="en-US" dirty="0"/>
               <a:t> 2017</a:t>
             </a:r>
-            <a:endParaRPr lang="en-US" dirty="0"/>
           </a:p>
         </p:txBody>
       </p:sp>
@@ -45873,31 +46199,27 @@
               <a:buChar char="-"/>
             </a:pPr>
             <a:r>
-              <a:rPr lang="en-US" dirty="0" err="1" smtClean="0"/>
-              <a:t>Jaarlijks</a:t>
+              <a:rPr lang="en-US" dirty="0" err="1"/>
+              <a:t>Jaarlijkse</a:t>
             </a:r>
             <a:r>
-              <a:rPr lang="en-US" dirty="0" err="1" smtClean="0"/>
-              <a:t>e</a:t>
-            </a:r>
-            <a:r>
-              <a:rPr lang="en-US" dirty="0" smtClean="0"/>
+              <a:rPr lang="en-US" dirty="0"/>
               <a:t> </a:t>
             </a:r>
             <a:r>
-              <a:rPr lang="en-US" dirty="0" err="1" smtClean="0"/>
+              <a:rPr lang="en-US" dirty="0" err="1"/>
               <a:t>conferentie</a:t>
             </a:r>
             <a:r>
-              <a:rPr lang="en-US" dirty="0" smtClean="0"/>
+              <a:rPr lang="en-US" dirty="0"/>
               <a:t> met 12.000+ </a:t>
             </a:r>
             <a:r>
-              <a:rPr lang="en-US" dirty="0" err="1" smtClean="0"/>
+              <a:rPr lang="en-US" dirty="0" err="1"/>
               <a:t>ontwikkelaars</a:t>
             </a:r>
             <a:r>
-              <a:rPr lang="en-US" dirty="0" smtClean="0"/>
+              <a:rPr lang="en-US" dirty="0"/>
               <a:t>.</a:t>
             </a:r>
           </a:p>
@@ -45915,187 +46237,8 @@
               <a:t>, </a:t>
             </a:r>
             <a:r>
-              <a:rPr lang="en-US" dirty="0" err="1" smtClean="0"/>
+              <a:rPr lang="en-US" dirty="0" err="1"/>
               <a:t>België</a:t>
-            </a:r>
-            <a:endParaRPr lang="en-US" dirty="0" smtClean="0"/>
-          </a:p>
-          <a:p>
-            <a:pPr marL="342900" indent="-342900">
-              <a:buFontTx/>
-              <a:buChar char="-"/>
-            </a:pPr>
-            <a:endParaRPr lang="en-US" dirty="0" smtClean="0"/>
-          </a:p>
-          <a:p>
-            <a:pPr marL="342900" indent="-342900">
-              <a:buFontTx/>
-              <a:buChar char="-"/>
-            </a:pPr>
-            <a:endParaRPr lang="en-US" dirty="0"/>
-          </a:p>
-          <a:p>
-            <a:pPr marL="342900" indent="-342900">
-              <a:buFontTx/>
-              <a:buChar char="-"/>
-            </a:pPr>
-            <a:endParaRPr lang="en-US" dirty="0" smtClean="0"/>
-          </a:p>
-          <a:p>
-            <a:pPr marL="342900" indent="-342900">
-              <a:buFontTx/>
-              <a:buChar char="-"/>
-            </a:pPr>
-            <a:endParaRPr lang="en-US" dirty="0"/>
-          </a:p>
-          <a:p>
-            <a:pPr marL="342900" indent="-342900">
-              <a:buFontTx/>
-              <a:buChar char="-"/>
-            </a:pPr>
-            <a:endParaRPr lang="en-US" dirty="0" smtClean="0"/>
-          </a:p>
-          <a:p>
-            <a:pPr marL="342900" indent="-342900">
-              <a:buFontTx/>
-              <a:buChar char="-"/>
-            </a:pPr>
-            <a:r>
-              <a:rPr lang="en-US" dirty="0" smtClean="0"/>
-              <a:t>Grote </a:t>
-            </a:r>
-            <a:r>
-              <a:rPr lang="en-US" dirty="0" err="1" smtClean="0"/>
-              <a:t>namen</a:t>
-            </a:r>
-            <a:r>
-              <a:rPr lang="en-US" dirty="0" smtClean="0"/>
-              <a:t> </a:t>
-            </a:r>
-            <a:r>
-              <a:rPr lang="en-US" dirty="0" err="1" smtClean="0"/>
-              <a:t>zoals</a:t>
-            </a:r>
-            <a:r>
-              <a:rPr lang="en-US" dirty="0" smtClean="0"/>
-              <a:t>: </a:t>
-            </a:r>
-            <a:r>
-              <a:rPr lang="en-US" dirty="0"/>
-              <a:t>	</a:t>
-            </a:r>
-            <a:endParaRPr lang="en-US" dirty="0" smtClean="0"/>
-          </a:p>
-          <a:p>
-            <a:pPr lvl="2" indent="0">
-              <a:buNone/>
-            </a:pPr>
-            <a:r>
-              <a:rPr lang="en-US" dirty="0"/>
-              <a:t>	</a:t>
-            </a:r>
-            <a:r>
-              <a:rPr lang="en-US" dirty="0" smtClean="0"/>
-              <a:t>- Brian </a:t>
-            </a:r>
-            <a:r>
-              <a:rPr lang="en-US" dirty="0" err="1" smtClean="0"/>
-              <a:t>Götz</a:t>
-            </a:r>
-            <a:r>
-              <a:rPr lang="en-US" dirty="0" smtClean="0"/>
-              <a:t> (Oracle)</a:t>
-            </a:r>
-          </a:p>
-          <a:p>
-            <a:pPr marL="0" lvl="2" indent="0">
-              <a:buNone/>
-            </a:pPr>
-            <a:r>
-              <a:rPr lang="en-US" dirty="0" smtClean="0"/>
-              <a:t>	- </a:t>
-            </a:r>
-            <a:r>
-              <a:rPr lang="en-US" dirty="0"/>
-              <a:t>Mark </a:t>
-            </a:r>
-            <a:r>
-              <a:rPr lang="en-US" dirty="0" smtClean="0"/>
-              <a:t>Reinhold </a:t>
-            </a:r>
-            <a:r>
-              <a:rPr lang="en-US" dirty="0"/>
-              <a:t>(Oracle</a:t>
-            </a:r>
-            <a:r>
-              <a:rPr lang="en-US" dirty="0" smtClean="0"/>
-              <a:t>)</a:t>
-            </a:r>
-          </a:p>
-          <a:p>
-            <a:r>
-              <a:rPr lang="en-US" dirty="0" smtClean="0"/>
-              <a:t>	- </a:t>
-            </a:r>
-            <a:r>
-              <a:rPr lang="en-US" dirty="0" err="1" smtClean="0"/>
-              <a:t>Juergen</a:t>
-            </a:r>
-            <a:r>
-              <a:rPr lang="en-US" dirty="0" smtClean="0"/>
-              <a:t> </a:t>
-            </a:r>
-            <a:r>
-              <a:rPr lang="en-US" dirty="0" err="1" smtClean="0"/>
-              <a:t>Hoeller</a:t>
-            </a:r>
-            <a:r>
-              <a:rPr lang="en-US" dirty="0" smtClean="0"/>
-              <a:t> (Spring / Pivotal)</a:t>
-            </a:r>
-          </a:p>
-          <a:p>
-            <a:r>
-              <a:rPr lang="en-US" dirty="0"/>
-              <a:t>	</a:t>
-            </a:r>
-            <a:r>
-              <a:rPr lang="en-US" dirty="0" smtClean="0"/>
-              <a:t>- </a:t>
-            </a:r>
-            <a:r>
-              <a:rPr lang="en-US" dirty="0" err="1" smtClean="0"/>
-              <a:t>Venkat</a:t>
-            </a:r>
-            <a:r>
-              <a:rPr lang="en-US" dirty="0" smtClean="0"/>
-              <a:t> </a:t>
-            </a:r>
-            <a:r>
-              <a:rPr lang="en-US" dirty="0" err="1" smtClean="0"/>
-              <a:t>Subramaniam</a:t>
-            </a:r>
-            <a:r>
-              <a:rPr lang="en-US" dirty="0" smtClean="0"/>
-              <a:t> (writer / conference speaker)</a:t>
-            </a:r>
-          </a:p>
-          <a:p>
-            <a:r>
-              <a:rPr lang="en-US" dirty="0"/>
-              <a:t>	</a:t>
-            </a:r>
-            <a:r>
-              <a:rPr lang="en-US" dirty="0" smtClean="0"/>
-              <a:t>- Martijn Verburg (</a:t>
-            </a:r>
-            <a:r>
-              <a:rPr lang="en-US" dirty="0" err="1" smtClean="0"/>
-              <a:t>jClarity</a:t>
-            </a:r>
-            <a:r>
-              <a:rPr lang="en-US" dirty="0" smtClean="0"/>
-              <a:t>)</a:t>
             </a:r>
             <a:endParaRPr lang="en-US" dirty="0"/>
           </a:p>
@@ -46111,7 +46254,152 @@
               <a:buFontTx/>
               <a:buChar char="-"/>
             </a:pPr>
-            <a:endParaRPr lang="en-US" dirty="0" smtClean="0"/>
+            <a:endParaRPr lang="en-US" dirty="0"/>
+          </a:p>
+          <a:p>
+            <a:pPr marL="342900" indent="-342900">
+              <a:buFontTx/>
+              <a:buChar char="-"/>
+            </a:pPr>
+            <a:endParaRPr lang="en-US" dirty="0"/>
+          </a:p>
+          <a:p>
+            <a:pPr marL="342900" indent="-342900">
+              <a:buFontTx/>
+              <a:buChar char="-"/>
+            </a:pPr>
+            <a:endParaRPr lang="en-US" dirty="0"/>
+          </a:p>
+          <a:p>
+            <a:pPr marL="342900" indent="-342900">
+              <a:buFontTx/>
+              <a:buChar char="-"/>
+            </a:pPr>
+            <a:endParaRPr lang="en-US" dirty="0"/>
+          </a:p>
+          <a:p>
+            <a:pPr marL="342900" indent="-342900">
+              <a:buFontTx/>
+              <a:buChar char="-"/>
+            </a:pPr>
+            <a:r>
+              <a:rPr lang="en-US" dirty="0"/>
+              <a:t>Grote </a:t>
+            </a:r>
+            <a:r>
+              <a:rPr lang="en-US" dirty="0" err="1"/>
+              <a:t>namen</a:t>
+            </a:r>
+            <a:r>
+              <a:rPr lang="en-US" dirty="0"/>
+              <a:t> </a:t>
+            </a:r>
+            <a:r>
+              <a:rPr lang="en-US" dirty="0" err="1"/>
+              <a:t>zoals</a:t>
+            </a:r>
+            <a:r>
+              <a:rPr lang="en-US" dirty="0"/>
+              <a:t>: 	</a:t>
+            </a:r>
+          </a:p>
+          <a:p>
+            <a:pPr lvl="2" indent="0">
+              <a:buNone/>
+            </a:pPr>
+            <a:r>
+              <a:rPr lang="en-US" dirty="0"/>
+              <a:t>	- Brian </a:t>
+            </a:r>
+            <a:r>
+              <a:rPr lang="en-US" dirty="0" err="1"/>
+              <a:t>Götz</a:t>
+            </a:r>
+            <a:r>
+              <a:rPr lang="en-US" dirty="0"/>
+              <a:t> (Oracle)</a:t>
+            </a:r>
+          </a:p>
+          <a:p>
+            <a:pPr marL="0" lvl="2" indent="0">
+              <a:buNone/>
+            </a:pPr>
+            <a:r>
+              <a:rPr lang="en-US" dirty="0"/>
+              <a:t>	- Mark Reinhold (Oracle)</a:t>
+            </a:r>
+          </a:p>
+          <a:p>
+            <a:r>
+              <a:rPr lang="en-US" dirty="0"/>
+              <a:t>	- </a:t>
+            </a:r>
+            <a:r>
+              <a:rPr lang="en-US" dirty="0" err="1"/>
+              <a:t>Juergen</a:t>
+            </a:r>
+            <a:r>
+              <a:rPr lang="en-US" dirty="0"/>
+              <a:t> </a:t>
+            </a:r>
+            <a:r>
+              <a:rPr lang="en-US" dirty="0" err="1"/>
+              <a:t>Hoeller</a:t>
+            </a:r>
+            <a:r>
+              <a:rPr lang="en-US" dirty="0"/>
+              <a:t> (Spring / Pivotal)</a:t>
+            </a:r>
+          </a:p>
+          <a:p>
+            <a:r>
+              <a:rPr lang="en-US" dirty="0"/>
+              <a:t>	- </a:t>
+            </a:r>
+            <a:r>
+              <a:rPr lang="en-US" dirty="0" err="1"/>
+              <a:t>Venkat</a:t>
+            </a:r>
+            <a:r>
+              <a:rPr lang="en-US" dirty="0"/>
+              <a:t> </a:t>
+            </a:r>
+            <a:r>
+              <a:rPr lang="en-US" dirty="0" err="1"/>
+              <a:t>Subramaniam</a:t>
+            </a:r>
+            <a:r>
+              <a:rPr lang="en-US" dirty="0"/>
+              <a:t> (writer / conference speaker)</a:t>
+            </a:r>
+          </a:p>
+          <a:p>
+            <a:r>
+              <a:rPr lang="en-US" dirty="0"/>
+              <a:t>	- Martijn Verburg (</a:t>
+            </a:r>
+            <a:r>
+              <a:rPr lang="en-US" dirty="0" err="1"/>
+              <a:t>jClarity</a:t>
+            </a:r>
+            <a:r>
+              <a:rPr lang="en-US" dirty="0"/>
+              <a:t>)</a:t>
+            </a:r>
+          </a:p>
+          <a:p>
+            <a:pPr marL="342900" indent="-342900">
+              <a:buFontTx/>
+              <a:buChar char="-"/>
+            </a:pPr>
+            <a:endParaRPr lang="en-US" dirty="0"/>
+          </a:p>
+          <a:p>
+            <a:pPr marL="342900" indent="-342900">
+              <a:buFontTx/>
+              <a:buChar char="-"/>
+            </a:pPr>
+            <a:endParaRPr lang="en-US" dirty="0"/>
           </a:p>
           <a:p>
             <a:pPr marL="342900" indent="-342900">
@@ -46196,13 +46484,6 @@
   <p:clrMapOvr>
     <a:masterClrMapping/>
   </p:clrMapOvr>
-  <p:timing>
-    <p:tnLst>
-      <p:par>
-        <p:cTn id="1" dur="indefinite" restart="never" nodeType="tmRoot"/>
-      </p:par>
-    </p:tnLst>
-  </p:timing>
 </p:sld>
 </file>
 
@@ -46239,11 +46520,11 @@
           <a:lstStyle/>
           <a:p>
             <a:r>
-              <a:rPr lang="en-US" dirty="0" smtClean="0"/>
+              <a:rPr lang="en-US" dirty="0"/>
               <a:t>Koos </a:t>
             </a:r>
             <a:r>
-              <a:rPr lang="en-US" dirty="0" err="1" smtClean="0"/>
+              <a:rPr lang="en-US" dirty="0" err="1"/>
               <a:t>praatjes</a:t>
             </a:r>
             <a:endParaRPr lang="en-US" dirty="0"/>
@@ -46271,25 +46552,25 @@
           <a:lstStyle/>
           <a:p>
             <a:r>
-              <a:rPr lang="en-US" dirty="0" smtClean="0"/>
+              <a:rPr lang="en-US" dirty="0"/>
               <a:t>Agenda Title 01</a:t>
             </a:r>
           </a:p>
           <a:p>
             <a:r>
-              <a:rPr lang="en-US" dirty="0" smtClean="0"/>
+              <a:rPr lang="en-US" dirty="0"/>
               <a:t>Agenda Title 02</a:t>
             </a:r>
           </a:p>
           <a:p>
             <a:r>
-              <a:rPr lang="en-US" dirty="0" smtClean="0"/>
+              <a:rPr lang="en-US" dirty="0"/>
               <a:t>Agenda Title 03</a:t>
             </a:r>
           </a:p>
           <a:p>
             <a:r>
-              <a:rPr lang="en-US" dirty="0" smtClean="0">
+              <a:rPr lang="en-US" dirty="0">
                 <a:solidFill>
                   <a:schemeClr val="tx2"/>
                 </a:solidFill>
@@ -46299,31 +46580,31 @@
           </a:p>
           <a:p>
             <a:r>
-              <a:rPr lang="en-US" dirty="0" smtClean="0"/>
+              <a:rPr lang="en-US" dirty="0"/>
               <a:t>Agenda Title 04</a:t>
             </a:r>
           </a:p>
           <a:p>
             <a:r>
-              <a:rPr lang="en-US" dirty="0" smtClean="0"/>
+              <a:rPr lang="en-US" dirty="0"/>
               <a:t>Agenda Title 05</a:t>
             </a:r>
           </a:p>
           <a:p>
             <a:r>
-              <a:rPr lang="en-US" dirty="0" smtClean="0"/>
+              <a:rPr lang="en-US" dirty="0"/>
               <a:t>Agenda Title 06</a:t>
             </a:r>
           </a:p>
           <a:p>
             <a:r>
-              <a:rPr lang="en-US" dirty="0" smtClean="0"/>
+              <a:rPr lang="en-US" dirty="0"/>
               <a:t>Agenda Title 07</a:t>
             </a:r>
           </a:p>
           <a:p>
             <a:r>
-              <a:rPr lang="en-US" dirty="0" smtClean="0">
+              <a:rPr lang="en-US" dirty="0">
                 <a:solidFill>
                   <a:schemeClr val="tx2"/>
                 </a:solidFill>
@@ -46370,13 +46651,6 @@
   <p:clrMapOvr>
     <a:masterClrMapping/>
   </p:clrMapOvr>
-  <p:timing>
-    <p:tnLst>
-      <p:par>
-        <p:cTn id="1" dur="indefinite" restart="never" nodeType="tmRoot"/>
-      </p:par>
-    </p:tnLst>
-  </p:timing>
 </p:sld>
 </file>
 
@@ -46413,11 +46687,11 @@
           <a:lstStyle/>
           <a:p>
             <a:r>
-              <a:rPr lang="en-US" dirty="0" smtClean="0"/>
+              <a:rPr lang="en-US" dirty="0"/>
               <a:t>Ronald </a:t>
             </a:r>
             <a:r>
-              <a:rPr lang="en-US" dirty="0" err="1" smtClean="0"/>
+              <a:rPr lang="en-US" dirty="0" err="1"/>
               <a:t>praatjes</a:t>
             </a:r>
             <a:endParaRPr lang="en-US" dirty="0"/>
@@ -46445,25 +46719,25 @@
           <a:lstStyle/>
           <a:p>
             <a:r>
-              <a:rPr lang="en-US" dirty="0" smtClean="0"/>
+              <a:rPr lang="en-US" dirty="0"/>
               <a:t>Agenda Title 01</a:t>
             </a:r>
           </a:p>
           <a:p>
             <a:r>
-              <a:rPr lang="en-US" dirty="0" smtClean="0"/>
+              <a:rPr lang="en-US" dirty="0"/>
               <a:t>Agenda Title 02</a:t>
             </a:r>
           </a:p>
           <a:p>
             <a:r>
-              <a:rPr lang="en-US" dirty="0" smtClean="0"/>
+              <a:rPr lang="en-US" dirty="0"/>
               <a:t>Agenda Title 03</a:t>
             </a:r>
           </a:p>
           <a:p>
             <a:r>
-              <a:rPr lang="en-US" dirty="0" smtClean="0">
+              <a:rPr lang="en-US" dirty="0">
                 <a:solidFill>
                   <a:schemeClr val="tx2"/>
                 </a:solidFill>
@@ -46473,31 +46747,31 @@
           </a:p>
           <a:p>
             <a:r>
-              <a:rPr lang="en-US" dirty="0" smtClean="0"/>
+              <a:rPr lang="en-US" dirty="0"/>
               <a:t>Agenda Title 04</a:t>
             </a:r>
           </a:p>
           <a:p>
             <a:r>
-              <a:rPr lang="en-US" dirty="0" smtClean="0"/>
+              <a:rPr lang="en-US" dirty="0"/>
               <a:t>Agenda Title 05</a:t>
             </a:r>
           </a:p>
           <a:p>
             <a:r>
-              <a:rPr lang="en-US" dirty="0" smtClean="0"/>
+              <a:rPr lang="en-US" dirty="0"/>
               <a:t>Agenda Title 06</a:t>
             </a:r>
           </a:p>
           <a:p>
             <a:r>
-              <a:rPr lang="en-US" dirty="0" smtClean="0"/>
+              <a:rPr lang="en-US" dirty="0"/>
               <a:t>Agenda Title 07</a:t>
             </a:r>
           </a:p>
           <a:p>
             <a:r>
-              <a:rPr lang="en-US" dirty="0" smtClean="0">
+              <a:rPr lang="en-US" dirty="0">
                 <a:solidFill>
                   <a:schemeClr val="tx2"/>
                 </a:solidFill>
@@ -46544,17 +46818,1107 @@
   <p:clrMapOvr>
     <a:masterClrMapping/>
   </p:clrMapOvr>
-  <p:timing>
-    <p:tnLst>
-      <p:par>
-        <p:cTn id="1" dur="indefinite" restart="never" nodeType="tmRoot"/>
-      </p:par>
-    </p:tnLst>
-  </p:timing>
 </p:sld>
 </file>
 
 <file path=ppt/slides/slide5.xml><?xml version="1.0" encoding="utf-8"?>
+<p:sld xmlns:a="http://schemas.openxmlformats.org/drawingml/2006/main" xmlns:r="http://schemas.openxmlformats.org/officeDocument/2006/relationships" xmlns:p="http://schemas.openxmlformats.org/presentationml/2006/main">
+  <p:cSld>
+    <p:spTree>
+      <p:nvGrpSpPr>
+        <p:cNvPr id="1" name=""/>
+        <p:cNvGrpSpPr/>
+        <p:nvPr/>
+      </p:nvGrpSpPr>
+      <p:grpSpPr>
+        <a:xfrm>
+          <a:off x="0" y="0"/>
+          <a:ext cx="0" cy="0"/>
+          <a:chOff x="0" y="0"/>
+          <a:chExt cx="0" cy="0"/>
+        </a:xfrm>
+      </p:grpSpPr>
+      <p:sp>
+        <p:nvSpPr>
+          <p:cNvPr id="2" name="Tijdelijke aanduiding voor dianummer 1">
+            <a:extLst>
+              <a:ext uri="{FF2B5EF4-FFF2-40B4-BE49-F238E27FC236}">
+                <a16:creationId xmlns:a16="http://schemas.microsoft.com/office/drawing/2014/main" id="{2B095657-6CD7-4BF4-A7B7-C3937132F8BB}"/>
+              </a:ext>
+            </a:extLst>
+          </p:cNvPr>
+          <p:cNvSpPr>
+            <a:spLocks noGrp="1"/>
+          </p:cNvSpPr>
+          <p:nvPr>
+            <p:ph type="sldNum" sz="quarter" idx="12"/>
+          </p:nvPr>
+        </p:nvSpPr>
+        <p:spPr/>
+        <p:txBody>
+          <a:bodyPr/>
+          <a:lstStyle/>
+          <a:p>
+            <a:fld id="{525A3C56-E491-49B2-93F3-63532DF516BC}" type="slidenum">
+              <a:rPr lang="en-US" smtClean="0"/>
+              <a:pPr/>
+              <a:t>5</a:t>
+            </a:fld>
+            <a:endParaRPr lang="en-US" dirty="0"/>
+          </a:p>
+        </p:txBody>
+      </p:sp>
+      <p:sp>
+        <p:nvSpPr>
+          <p:cNvPr id="3" name="Titel 2">
+            <a:extLst>
+              <a:ext uri="{FF2B5EF4-FFF2-40B4-BE49-F238E27FC236}">
+                <a16:creationId xmlns:a16="http://schemas.microsoft.com/office/drawing/2014/main" id="{F973BF76-64CB-409F-8EA7-EF6EE3F74CA4}"/>
+              </a:ext>
+            </a:extLst>
+          </p:cNvPr>
+          <p:cNvSpPr>
+            <a:spLocks noGrp="1"/>
+          </p:cNvSpPr>
+          <p:nvPr>
+            <p:ph type="title"/>
+          </p:nvPr>
+        </p:nvSpPr>
+        <p:spPr/>
+        <p:txBody>
+          <a:bodyPr/>
+          <a:lstStyle/>
+          <a:p>
+            <a:r>
+              <a:rPr lang="nl-NL" dirty="0"/>
+              <a:t>Java 10</a:t>
+            </a:r>
+          </a:p>
+        </p:txBody>
+      </p:sp>
+      <p:sp>
+        <p:nvSpPr>
+          <p:cNvPr id="4" name="Tijdelijke aanduiding voor inhoud 3">
+            <a:extLst>
+              <a:ext uri="{FF2B5EF4-FFF2-40B4-BE49-F238E27FC236}">
+                <a16:creationId xmlns:a16="http://schemas.microsoft.com/office/drawing/2014/main" id="{6F3176B1-4CAF-4FAD-A02F-5F3488A540DC}"/>
+              </a:ext>
+            </a:extLst>
+          </p:cNvPr>
+          <p:cNvSpPr>
+            <a:spLocks noGrp="1"/>
+          </p:cNvSpPr>
+          <p:nvPr>
+            <p:ph sz="quarter" idx="17"/>
+          </p:nvPr>
+        </p:nvSpPr>
+        <p:spPr>
+          <a:xfrm>
+            <a:off x="449263" y="1266826"/>
+            <a:ext cx="7922949" cy="3474310"/>
+          </a:xfrm>
+        </p:spPr>
+        <p:txBody>
+          <a:bodyPr>
+            <a:normAutofit lnSpcReduction="10000"/>
+          </a:bodyPr>
+          <a:lstStyle/>
+          <a:p>
+            <a:r>
+              <a:rPr lang="nl-NL" dirty="0"/>
+              <a:t>Maart 2018</a:t>
+            </a:r>
+          </a:p>
+          <a:p>
+            <a:endParaRPr lang="nl-NL" dirty="0"/>
+          </a:p>
+          <a:p>
+            <a:r>
+              <a:rPr lang="nl-NL" dirty="0"/>
+              <a:t>Half jaarlijkse releases, September 2018 volgende</a:t>
+            </a:r>
+          </a:p>
+          <a:p>
+            <a:endParaRPr lang="nl-NL" dirty="0"/>
+          </a:p>
+          <a:p>
+            <a:r>
+              <a:rPr lang="nl-NL" dirty="0"/>
+              <a:t>Elke 3 jaar LTS, waarvan september 2018 LTS</a:t>
+            </a:r>
+          </a:p>
+          <a:p>
+            <a:endParaRPr lang="nl-NL" dirty="0"/>
+          </a:p>
+          <a:p>
+            <a:r>
+              <a:rPr lang="nl-NL" dirty="0"/>
+              <a:t>Versienummering</a:t>
+            </a:r>
+          </a:p>
+          <a:p>
+            <a:r>
+              <a:rPr lang="nl-NL" dirty="0"/>
+              <a:t>Geen 18.3 / 18.9 (</a:t>
+            </a:r>
+            <a:r>
+              <a:rPr lang="nl-NL" dirty="0" err="1"/>
+              <a:t>ubuntu</a:t>
+            </a:r>
+            <a:r>
+              <a:rPr lang="nl-NL" dirty="0"/>
+              <a:t>) maar 10, 11, etc.</a:t>
+            </a:r>
+          </a:p>
+          <a:p>
+            <a:endParaRPr lang="nl-NL" dirty="0"/>
+          </a:p>
+          <a:p>
+            <a:r>
+              <a:rPr lang="nl-NL" dirty="0"/>
+              <a:t>Java 10 project amber</a:t>
+            </a:r>
+          </a:p>
+        </p:txBody>
+      </p:sp>
+      <p:pic>
+        <p:nvPicPr>
+          <p:cNvPr id="6" name="Afbeelding 5">
+            <a:extLst>
+              <a:ext uri="{FF2B5EF4-FFF2-40B4-BE49-F238E27FC236}">
+                <a16:creationId xmlns:a16="http://schemas.microsoft.com/office/drawing/2014/main" id="{D1B1E264-E64D-4B3E-867A-00CFCF6DCDE6}"/>
+              </a:ext>
+            </a:extLst>
+          </p:cNvPr>
+          <p:cNvPicPr>
+            <a:picLocks noChangeAspect="1"/>
+          </p:cNvPicPr>
+          <p:nvPr/>
+        </p:nvPicPr>
+        <p:blipFill>
+          <a:blip r:embed="rId2"/>
+          <a:stretch>
+            <a:fillRect/>
+          </a:stretch>
+        </p:blipFill>
+        <p:spPr>
+          <a:xfrm>
+            <a:off x="3425476" y="4333213"/>
+            <a:ext cx="4705350" cy="1295400"/>
+          </a:xfrm>
+          <a:prstGeom prst="rect">
+            <a:avLst/>
+          </a:prstGeom>
+        </p:spPr>
+      </p:pic>
+    </p:spTree>
+    <p:extLst>
+      <p:ext uri="{BB962C8B-B14F-4D97-AF65-F5344CB8AC3E}">
+        <p14:creationId xmlns:p14="http://schemas.microsoft.com/office/powerpoint/2010/main" val="3700852458"/>
+      </p:ext>
+    </p:extLst>
+  </p:cSld>
+  <p:clrMapOvr>
+    <a:masterClrMapping/>
+  </p:clrMapOvr>
+</p:sld>
+</file>
+
+<file path=ppt/slides/slide6.xml><?xml version="1.0" encoding="utf-8"?>
+<p:sld xmlns:a="http://schemas.openxmlformats.org/drawingml/2006/main" xmlns:r="http://schemas.openxmlformats.org/officeDocument/2006/relationships" xmlns:p="http://schemas.openxmlformats.org/presentationml/2006/main">
+  <p:cSld>
+    <p:spTree>
+      <p:nvGrpSpPr>
+        <p:cNvPr id="1" name=""/>
+        <p:cNvGrpSpPr/>
+        <p:nvPr/>
+      </p:nvGrpSpPr>
+      <p:grpSpPr>
+        <a:xfrm>
+          <a:off x="0" y="0"/>
+          <a:ext cx="0" cy="0"/>
+          <a:chOff x="0" y="0"/>
+          <a:chExt cx="0" cy="0"/>
+        </a:xfrm>
+      </p:grpSpPr>
+      <p:sp>
+        <p:nvSpPr>
+          <p:cNvPr id="2" name="Tijdelijke aanduiding voor dianummer 1">
+            <a:extLst>
+              <a:ext uri="{FF2B5EF4-FFF2-40B4-BE49-F238E27FC236}">
+                <a16:creationId xmlns:a16="http://schemas.microsoft.com/office/drawing/2014/main" id="{19C2A6B4-F5A9-4A57-9753-E84F96729142}"/>
+              </a:ext>
+            </a:extLst>
+          </p:cNvPr>
+          <p:cNvSpPr>
+            <a:spLocks noGrp="1"/>
+          </p:cNvSpPr>
+          <p:nvPr>
+            <p:ph type="sldNum" sz="quarter" idx="12"/>
+          </p:nvPr>
+        </p:nvSpPr>
+        <p:spPr/>
+        <p:txBody>
+          <a:bodyPr/>
+          <a:lstStyle/>
+          <a:p>
+            <a:fld id="{525A3C56-E491-49B2-93F3-63532DF516BC}" type="slidenum">
+              <a:rPr lang="en-US" smtClean="0"/>
+              <a:pPr/>
+              <a:t>6</a:t>
+            </a:fld>
+            <a:endParaRPr lang="en-US" dirty="0"/>
+          </a:p>
+        </p:txBody>
+      </p:sp>
+      <p:sp>
+        <p:nvSpPr>
+          <p:cNvPr id="3" name="Titel 2">
+            <a:extLst>
+              <a:ext uri="{FF2B5EF4-FFF2-40B4-BE49-F238E27FC236}">
+                <a16:creationId xmlns:a16="http://schemas.microsoft.com/office/drawing/2014/main" id="{6EE6395A-1C74-49D4-B5B2-7281017A6F2B}"/>
+              </a:ext>
+            </a:extLst>
+          </p:cNvPr>
+          <p:cNvSpPr>
+            <a:spLocks noGrp="1"/>
+          </p:cNvSpPr>
+          <p:nvPr>
+            <p:ph type="title"/>
+          </p:nvPr>
+        </p:nvSpPr>
+        <p:spPr/>
+        <p:txBody>
+          <a:bodyPr/>
+          <a:lstStyle/>
+          <a:p>
+            <a:r>
+              <a:rPr lang="en-US" dirty="0"/>
+              <a:t>Java EE 8: What's New in the Java EE 8 Release</a:t>
+            </a:r>
+          </a:p>
+        </p:txBody>
+      </p:sp>
+      <p:sp>
+        <p:nvSpPr>
+          <p:cNvPr id="4" name="Tijdelijke aanduiding voor inhoud 3">
+            <a:extLst>
+              <a:ext uri="{FF2B5EF4-FFF2-40B4-BE49-F238E27FC236}">
+                <a16:creationId xmlns:a16="http://schemas.microsoft.com/office/drawing/2014/main" id="{46A50AAB-F9B6-483D-833A-4CEF2364D0FB}"/>
+              </a:ext>
+            </a:extLst>
+          </p:cNvPr>
+          <p:cNvSpPr>
+            <a:spLocks noGrp="1"/>
+          </p:cNvSpPr>
+          <p:nvPr>
+            <p:ph sz="quarter" idx="17"/>
+          </p:nvPr>
+        </p:nvSpPr>
+        <p:spPr/>
+        <p:txBody>
+          <a:bodyPr/>
+          <a:lstStyle/>
+          <a:p>
+            <a:r>
+              <a:rPr lang="nl-NL" dirty="0" err="1"/>
+              <a:t>Jax-rs</a:t>
+            </a:r>
+            <a:r>
+              <a:rPr lang="nl-NL" dirty="0"/>
+              <a:t> </a:t>
+            </a:r>
+            <a:r>
+              <a:rPr lang="nl-NL" dirty="0" err="1"/>
+              <a:t>client</a:t>
+            </a:r>
+            <a:r>
+              <a:rPr lang="nl-NL" dirty="0"/>
+              <a:t> </a:t>
+            </a:r>
+            <a:r>
+              <a:rPr lang="nl-NL" dirty="0" err="1"/>
+              <a:t>api</a:t>
+            </a:r>
+            <a:endParaRPr lang="nl-NL" dirty="0"/>
+          </a:p>
+          <a:p>
+            <a:endParaRPr lang="nl-NL" dirty="0"/>
+          </a:p>
+        </p:txBody>
+      </p:sp>
+      <p:pic>
+        <p:nvPicPr>
+          <p:cNvPr id="6" name="Afbeelding 5">
+            <a:extLst>
+              <a:ext uri="{FF2B5EF4-FFF2-40B4-BE49-F238E27FC236}">
+                <a16:creationId xmlns:a16="http://schemas.microsoft.com/office/drawing/2014/main" id="{B89BD76F-FD40-4B48-ABAC-4766791E4CFD}"/>
+              </a:ext>
+            </a:extLst>
+          </p:cNvPr>
+          <p:cNvPicPr>
+            <a:picLocks noChangeAspect="1"/>
+          </p:cNvPicPr>
+          <p:nvPr/>
+        </p:nvPicPr>
+        <p:blipFill>
+          <a:blip r:embed="rId2"/>
+          <a:stretch>
+            <a:fillRect/>
+          </a:stretch>
+        </p:blipFill>
+        <p:spPr>
+          <a:xfrm>
+            <a:off x="4333875" y="1106489"/>
+            <a:ext cx="4810125" cy="2381250"/>
+          </a:xfrm>
+          <a:prstGeom prst="rect">
+            <a:avLst/>
+          </a:prstGeom>
+        </p:spPr>
+      </p:pic>
+      <p:pic>
+        <p:nvPicPr>
+          <p:cNvPr id="7" name="Afbeelding 6">
+            <a:extLst>
+              <a:ext uri="{FF2B5EF4-FFF2-40B4-BE49-F238E27FC236}">
+                <a16:creationId xmlns:a16="http://schemas.microsoft.com/office/drawing/2014/main" id="{DDDD4534-999C-4812-A99A-2E94DDA45CB7}"/>
+              </a:ext>
+            </a:extLst>
+          </p:cNvPr>
+          <p:cNvPicPr>
+            <a:picLocks noChangeAspect="1"/>
+          </p:cNvPicPr>
+          <p:nvPr/>
+        </p:nvPicPr>
+        <p:blipFill>
+          <a:blip r:embed="rId3"/>
+          <a:stretch>
+            <a:fillRect/>
+          </a:stretch>
+        </p:blipFill>
+        <p:spPr>
+          <a:xfrm>
+            <a:off x="1441451" y="3892550"/>
+            <a:ext cx="4857750" cy="2295525"/>
+          </a:xfrm>
+          <a:prstGeom prst="rect">
+            <a:avLst/>
+          </a:prstGeom>
+        </p:spPr>
+      </p:pic>
+      <p:pic>
+        <p:nvPicPr>
+          <p:cNvPr id="8" name="Afbeelding 7">
+            <a:extLst>
+              <a:ext uri="{FF2B5EF4-FFF2-40B4-BE49-F238E27FC236}">
+                <a16:creationId xmlns:a16="http://schemas.microsoft.com/office/drawing/2014/main" id="{9C1B5BAB-D861-4C5A-8D48-79AA45A25528}"/>
+              </a:ext>
+            </a:extLst>
+          </p:cNvPr>
+          <p:cNvPicPr>
+            <a:picLocks noChangeAspect="1"/>
+          </p:cNvPicPr>
+          <p:nvPr/>
+        </p:nvPicPr>
+        <p:blipFill>
+          <a:blip r:embed="rId4"/>
+          <a:stretch>
+            <a:fillRect/>
+          </a:stretch>
+        </p:blipFill>
+        <p:spPr>
+          <a:xfrm>
+            <a:off x="114301" y="2130424"/>
+            <a:ext cx="3943350" cy="1628775"/>
+          </a:xfrm>
+          <a:prstGeom prst="rect">
+            <a:avLst/>
+          </a:prstGeom>
+        </p:spPr>
+      </p:pic>
+    </p:spTree>
+    <p:extLst>
+      <p:ext uri="{BB962C8B-B14F-4D97-AF65-F5344CB8AC3E}">
+        <p14:creationId xmlns:p14="http://schemas.microsoft.com/office/powerpoint/2010/main" val="162088029"/>
+      </p:ext>
+    </p:extLst>
+  </p:cSld>
+  <p:clrMapOvr>
+    <a:masterClrMapping/>
+  </p:clrMapOvr>
+</p:sld>
+</file>
+
+<file path=ppt/slides/slide7.xml><?xml version="1.0" encoding="utf-8"?>
+<p:sld xmlns:a="http://schemas.openxmlformats.org/drawingml/2006/main" xmlns:r="http://schemas.openxmlformats.org/officeDocument/2006/relationships" xmlns:p="http://schemas.openxmlformats.org/presentationml/2006/main">
+  <p:cSld>
+    <p:spTree>
+      <p:nvGrpSpPr>
+        <p:cNvPr id="1" name=""/>
+        <p:cNvGrpSpPr/>
+        <p:nvPr/>
+      </p:nvGrpSpPr>
+      <p:grpSpPr>
+        <a:xfrm>
+          <a:off x="0" y="0"/>
+          <a:ext cx="0" cy="0"/>
+          <a:chOff x="0" y="0"/>
+          <a:chExt cx="0" cy="0"/>
+        </a:xfrm>
+      </p:grpSpPr>
+      <p:sp>
+        <p:nvSpPr>
+          <p:cNvPr id="2" name="Tijdelijke aanduiding voor dianummer 1">
+            <a:extLst>
+              <a:ext uri="{FF2B5EF4-FFF2-40B4-BE49-F238E27FC236}">
+                <a16:creationId xmlns:a16="http://schemas.microsoft.com/office/drawing/2014/main" id="{AC5E20A8-0E69-47B7-85B8-166FC80941EF}"/>
+              </a:ext>
+            </a:extLst>
+          </p:cNvPr>
+          <p:cNvSpPr>
+            <a:spLocks noGrp="1"/>
+          </p:cNvSpPr>
+          <p:nvPr>
+            <p:ph type="sldNum" sz="quarter" idx="12"/>
+          </p:nvPr>
+        </p:nvSpPr>
+        <p:spPr/>
+        <p:txBody>
+          <a:bodyPr/>
+          <a:lstStyle/>
+          <a:p>
+            <a:fld id="{525A3C56-E491-49B2-93F3-63532DF516BC}" type="slidenum">
+              <a:rPr lang="en-US" smtClean="0"/>
+              <a:pPr/>
+              <a:t>7</a:t>
+            </a:fld>
+            <a:endParaRPr lang="en-US" dirty="0"/>
+          </a:p>
+        </p:txBody>
+      </p:sp>
+      <p:sp>
+        <p:nvSpPr>
+          <p:cNvPr id="3" name="Titel 2">
+            <a:extLst>
+              <a:ext uri="{FF2B5EF4-FFF2-40B4-BE49-F238E27FC236}">
+                <a16:creationId xmlns:a16="http://schemas.microsoft.com/office/drawing/2014/main" id="{9CAA6795-3930-4248-9E62-E752118E2124}"/>
+              </a:ext>
+            </a:extLst>
+          </p:cNvPr>
+          <p:cNvSpPr>
+            <a:spLocks noGrp="1"/>
+          </p:cNvSpPr>
+          <p:nvPr>
+            <p:ph type="title"/>
+          </p:nvPr>
+        </p:nvSpPr>
+        <p:spPr/>
+        <p:txBody>
+          <a:bodyPr/>
+          <a:lstStyle/>
+          <a:p>
+            <a:r>
+              <a:rPr lang="nl-NL" dirty="0" err="1"/>
+              <a:t>Going</a:t>
+            </a:r>
+            <a:r>
+              <a:rPr lang="nl-NL" dirty="0"/>
+              <a:t> </a:t>
+            </a:r>
+            <a:r>
+              <a:rPr lang="nl-NL" dirty="0" err="1"/>
+              <a:t>reactive</a:t>
+            </a:r>
+            <a:r>
+              <a:rPr lang="nl-NL" dirty="0"/>
+              <a:t> </a:t>
+            </a:r>
+            <a:r>
+              <a:rPr lang="nl-NL" dirty="0" err="1"/>
+              <a:t>with</a:t>
+            </a:r>
+            <a:r>
+              <a:rPr lang="nl-NL" dirty="0"/>
+              <a:t> spring 5 &amp; project reactor</a:t>
+            </a:r>
+          </a:p>
+        </p:txBody>
+      </p:sp>
+      <p:sp>
+        <p:nvSpPr>
+          <p:cNvPr id="4" name="Tijdelijke aanduiding voor inhoud 3">
+            <a:extLst>
+              <a:ext uri="{FF2B5EF4-FFF2-40B4-BE49-F238E27FC236}">
+                <a16:creationId xmlns:a16="http://schemas.microsoft.com/office/drawing/2014/main" id="{3E18D6BA-14D8-4030-A619-83979697F622}"/>
+              </a:ext>
+            </a:extLst>
+          </p:cNvPr>
+          <p:cNvSpPr>
+            <a:spLocks noGrp="1"/>
+          </p:cNvSpPr>
+          <p:nvPr>
+            <p:ph sz="quarter" idx="17"/>
+          </p:nvPr>
+        </p:nvSpPr>
+        <p:spPr/>
+        <p:txBody>
+          <a:bodyPr/>
+          <a:lstStyle/>
+          <a:p>
+            <a:r>
+              <a:rPr lang="nl-NL" dirty="0" err="1"/>
+              <a:t>Async</a:t>
+            </a:r>
+            <a:r>
+              <a:rPr lang="nl-NL" dirty="0"/>
+              <a:t> streams</a:t>
+            </a:r>
+          </a:p>
+          <a:p>
+            <a:endParaRPr lang="nl-NL" dirty="0"/>
+          </a:p>
+          <a:p>
+            <a:r>
+              <a:rPr lang="nl-NL" dirty="0"/>
+              <a:t>start.spring.io</a:t>
+            </a:r>
+          </a:p>
+          <a:p>
+            <a:endParaRPr lang="nl-NL" dirty="0"/>
+          </a:p>
+          <a:p>
+            <a:r>
+              <a:rPr lang="nl-NL" dirty="0"/>
+              <a:t>Flux&lt;Object&gt;</a:t>
+            </a:r>
+          </a:p>
+          <a:p>
+            <a:r>
+              <a:rPr lang="nl-NL" dirty="0"/>
+              <a:t>Mono&lt;</a:t>
+            </a:r>
+            <a:r>
+              <a:rPr lang="nl-NL" dirty="0" err="1"/>
+              <a:t>Ojbect</a:t>
+            </a:r>
+            <a:r>
+              <a:rPr lang="nl-NL" dirty="0"/>
+              <a:t>&gt;</a:t>
+            </a:r>
+          </a:p>
+          <a:p>
+            <a:endParaRPr lang="nl-NL" dirty="0"/>
+          </a:p>
+          <a:p>
+            <a:r>
+              <a:rPr lang="nl-NL" dirty="0"/>
+              <a:t>Geen spring </a:t>
+            </a:r>
+            <a:r>
+              <a:rPr lang="nl-NL" dirty="0" err="1"/>
+              <a:t>mvc</a:t>
+            </a:r>
+            <a:r>
+              <a:rPr lang="nl-NL" dirty="0"/>
+              <a:t> spring </a:t>
+            </a:r>
+            <a:r>
+              <a:rPr lang="nl-NL" dirty="0" err="1"/>
+              <a:t>webflux</a:t>
+            </a:r>
+            <a:endParaRPr lang="nl-NL" dirty="0"/>
+          </a:p>
+          <a:p>
+            <a:endParaRPr lang="nl-NL" dirty="0"/>
+          </a:p>
+        </p:txBody>
+      </p:sp>
+      <p:sp>
+        <p:nvSpPr>
+          <p:cNvPr id="5" name="Tijdelijke aanduiding voor inhoud 4">
+            <a:extLst>
+              <a:ext uri="{FF2B5EF4-FFF2-40B4-BE49-F238E27FC236}">
+                <a16:creationId xmlns:a16="http://schemas.microsoft.com/office/drawing/2014/main" id="{2B5DAB0E-A60F-4D33-B1F3-25F4B09F3E7E}"/>
+              </a:ext>
+            </a:extLst>
+          </p:cNvPr>
+          <p:cNvSpPr>
+            <a:spLocks noGrp="1"/>
+          </p:cNvSpPr>
+          <p:nvPr>
+            <p:ph sz="quarter" idx="23"/>
+          </p:nvPr>
+        </p:nvSpPr>
+        <p:spPr/>
+        <p:txBody>
+          <a:bodyPr/>
+          <a:lstStyle/>
+          <a:p>
+            <a:endParaRPr lang="nl-NL"/>
+          </a:p>
+        </p:txBody>
+      </p:sp>
+    </p:spTree>
+    <p:extLst>
+      <p:ext uri="{BB962C8B-B14F-4D97-AF65-F5344CB8AC3E}">
+        <p14:creationId xmlns:p14="http://schemas.microsoft.com/office/powerpoint/2010/main" val="3944130145"/>
+      </p:ext>
+    </p:extLst>
+  </p:cSld>
+  <p:clrMapOvr>
+    <a:masterClrMapping/>
+  </p:clrMapOvr>
+</p:sld>
+</file>
+
+<file path=ppt/slides/slide8.xml><?xml version="1.0" encoding="utf-8"?>
+<p:sld xmlns:a="http://schemas.openxmlformats.org/drawingml/2006/main" xmlns:r="http://schemas.openxmlformats.org/officeDocument/2006/relationships" xmlns:p="http://schemas.openxmlformats.org/presentationml/2006/main">
+  <p:cSld>
+    <p:spTree>
+      <p:nvGrpSpPr>
+        <p:cNvPr id="1" name=""/>
+        <p:cNvGrpSpPr/>
+        <p:nvPr/>
+      </p:nvGrpSpPr>
+      <p:grpSpPr>
+        <a:xfrm>
+          <a:off x="0" y="0"/>
+          <a:ext cx="0" cy="0"/>
+          <a:chOff x="0" y="0"/>
+          <a:chExt cx="0" cy="0"/>
+        </a:xfrm>
+      </p:grpSpPr>
+      <p:sp>
+        <p:nvSpPr>
+          <p:cNvPr id="2" name="Tijdelijke aanduiding voor dianummer 1">
+            <a:extLst>
+              <a:ext uri="{FF2B5EF4-FFF2-40B4-BE49-F238E27FC236}">
+                <a16:creationId xmlns:a16="http://schemas.microsoft.com/office/drawing/2014/main" id="{0A9B8364-BEF8-4B4B-AD8F-09E5C9BACDE4}"/>
+              </a:ext>
+            </a:extLst>
+          </p:cNvPr>
+          <p:cNvSpPr>
+            <a:spLocks noGrp="1"/>
+          </p:cNvSpPr>
+          <p:nvPr>
+            <p:ph type="sldNum" sz="quarter" idx="12"/>
+          </p:nvPr>
+        </p:nvSpPr>
+        <p:spPr/>
+        <p:txBody>
+          <a:bodyPr/>
+          <a:lstStyle/>
+          <a:p>
+            <a:fld id="{525A3C56-E491-49B2-93F3-63532DF516BC}" type="slidenum">
+              <a:rPr lang="en-US" smtClean="0"/>
+              <a:pPr/>
+              <a:t>8</a:t>
+            </a:fld>
+            <a:endParaRPr lang="en-US" dirty="0"/>
+          </a:p>
+        </p:txBody>
+      </p:sp>
+      <p:sp>
+        <p:nvSpPr>
+          <p:cNvPr id="3" name="Titel 2">
+            <a:extLst>
+              <a:ext uri="{FF2B5EF4-FFF2-40B4-BE49-F238E27FC236}">
+                <a16:creationId xmlns:a16="http://schemas.microsoft.com/office/drawing/2014/main" id="{24EA54E9-55E8-4788-BABF-4E5AEF41D855}"/>
+              </a:ext>
+            </a:extLst>
+          </p:cNvPr>
+          <p:cNvSpPr>
+            <a:spLocks noGrp="1"/>
+          </p:cNvSpPr>
+          <p:nvPr>
+            <p:ph type="title"/>
+          </p:nvPr>
+        </p:nvSpPr>
+        <p:spPr/>
+        <p:txBody>
+          <a:bodyPr/>
+          <a:lstStyle/>
+          <a:p>
+            <a:r>
+              <a:rPr lang="nl-NL" dirty="0" err="1"/>
+              <a:t>Angular</a:t>
+            </a:r>
+            <a:r>
+              <a:rPr lang="nl-NL" dirty="0"/>
+              <a:t> </a:t>
+            </a:r>
+            <a:r>
+              <a:rPr lang="nl-NL" dirty="0" err="1"/>
+              <a:t>vs</a:t>
+            </a:r>
+            <a:r>
+              <a:rPr lang="nl-NL" dirty="0"/>
+              <a:t> </a:t>
+            </a:r>
+            <a:r>
+              <a:rPr lang="nl-NL" dirty="0" err="1"/>
+              <a:t>React</a:t>
+            </a:r>
+            <a:r>
+              <a:rPr lang="nl-NL" dirty="0"/>
+              <a:t> </a:t>
+            </a:r>
+            <a:r>
+              <a:rPr lang="nl-NL" dirty="0" err="1"/>
+              <a:t>Smackdown</a:t>
+            </a:r>
+            <a:endParaRPr lang="nl-NL" dirty="0"/>
+          </a:p>
+        </p:txBody>
+      </p:sp>
+      <p:sp>
+        <p:nvSpPr>
+          <p:cNvPr id="4" name="Tijdelijke aanduiding voor inhoud 3">
+            <a:extLst>
+              <a:ext uri="{FF2B5EF4-FFF2-40B4-BE49-F238E27FC236}">
+                <a16:creationId xmlns:a16="http://schemas.microsoft.com/office/drawing/2014/main" id="{F274DA45-BF34-4475-B626-B0F6D6330CF6}"/>
+              </a:ext>
+            </a:extLst>
+          </p:cNvPr>
+          <p:cNvSpPr>
+            <a:spLocks noGrp="1"/>
+          </p:cNvSpPr>
+          <p:nvPr>
+            <p:ph sz="quarter" idx="17"/>
+          </p:nvPr>
+        </p:nvSpPr>
+        <p:spPr/>
+        <p:txBody>
+          <a:bodyPr>
+            <a:normAutofit fontScale="77500" lnSpcReduction="20000"/>
+          </a:bodyPr>
+          <a:lstStyle/>
+          <a:p>
+            <a:r>
+              <a:rPr lang="nl-NL" dirty="0"/>
+              <a:t>Front end javascript </a:t>
+            </a:r>
+            <a:r>
+              <a:rPr lang="nl-NL" dirty="0" err="1"/>
+              <a:t>frameworks</a:t>
+            </a:r>
+            <a:endParaRPr lang="nl-NL" dirty="0"/>
+          </a:p>
+          <a:p>
+            <a:endParaRPr lang="nl-NL" dirty="0"/>
+          </a:p>
+          <a:p>
+            <a:r>
+              <a:rPr lang="nl-NL" dirty="0" err="1"/>
+              <a:t>Angular</a:t>
+            </a:r>
+            <a:r>
+              <a:rPr lang="nl-NL" dirty="0"/>
+              <a:t> google</a:t>
+            </a:r>
+          </a:p>
+          <a:p>
+            <a:r>
+              <a:rPr lang="nl-NL" dirty="0" err="1"/>
+              <a:t>React</a:t>
+            </a:r>
+            <a:r>
+              <a:rPr lang="nl-NL" dirty="0"/>
+              <a:t> facebook</a:t>
+            </a:r>
+          </a:p>
+          <a:p>
+            <a:endParaRPr lang="nl-NL" dirty="0"/>
+          </a:p>
+          <a:p>
+            <a:r>
+              <a:rPr lang="nl-NL" dirty="0" err="1"/>
+              <a:t>Angular</a:t>
+            </a:r>
+            <a:r>
+              <a:rPr lang="nl-NL" dirty="0"/>
+              <a:t> meer gebruikt in de zaal</a:t>
+            </a:r>
+          </a:p>
+          <a:p>
+            <a:r>
+              <a:rPr lang="nl-NL" dirty="0" err="1"/>
+              <a:t>React</a:t>
+            </a:r>
+            <a:r>
+              <a:rPr lang="nl-NL" dirty="0"/>
+              <a:t> compacter</a:t>
+            </a:r>
+          </a:p>
+          <a:p>
+            <a:endParaRPr lang="nl-NL" dirty="0"/>
+          </a:p>
+          <a:p>
+            <a:r>
+              <a:rPr lang="nl-NL" dirty="0"/>
+              <a:t>Technical: </a:t>
+            </a:r>
+            <a:r>
+              <a:rPr lang="nl-NL" dirty="0" err="1"/>
+              <a:t>Angular</a:t>
+            </a:r>
+            <a:endParaRPr lang="nl-NL" dirty="0"/>
+          </a:p>
+          <a:p>
+            <a:r>
+              <a:rPr lang="nl-NL" dirty="0" err="1"/>
+              <a:t>Philosophical</a:t>
+            </a:r>
+            <a:r>
+              <a:rPr lang="nl-NL" dirty="0"/>
+              <a:t> </a:t>
+            </a:r>
+            <a:r>
+              <a:rPr lang="nl-NL" dirty="0" err="1"/>
+              <a:t>differences</a:t>
+            </a:r>
+            <a:r>
+              <a:rPr lang="nl-NL" dirty="0"/>
+              <a:t>: </a:t>
+            </a:r>
+            <a:r>
+              <a:rPr lang="nl-NL" dirty="0" err="1"/>
+              <a:t>Angular</a:t>
+            </a:r>
+            <a:endParaRPr lang="nl-NL" dirty="0"/>
+          </a:p>
+          <a:p>
+            <a:r>
+              <a:rPr lang="nl-NL" dirty="0" err="1"/>
+              <a:t>Usability</a:t>
+            </a:r>
+            <a:r>
+              <a:rPr lang="nl-NL" dirty="0"/>
+              <a:t>: </a:t>
+            </a:r>
+            <a:r>
+              <a:rPr lang="nl-NL" dirty="0" err="1"/>
+              <a:t>React</a:t>
+            </a:r>
+            <a:r>
+              <a:rPr lang="nl-NL" dirty="0"/>
+              <a:t> (</a:t>
+            </a:r>
+            <a:r>
+              <a:rPr lang="nl-NL" dirty="0" err="1"/>
+              <a:t>angular</a:t>
+            </a:r>
+            <a:r>
+              <a:rPr lang="nl-NL" dirty="0"/>
+              <a:t> minder flexibel)</a:t>
+            </a:r>
+          </a:p>
+          <a:p>
+            <a:r>
+              <a:rPr lang="nl-NL" dirty="0" err="1"/>
+              <a:t>Easyer</a:t>
+            </a:r>
+            <a:r>
+              <a:rPr lang="nl-NL" dirty="0"/>
+              <a:t> </a:t>
+            </a:r>
+            <a:r>
+              <a:rPr lang="nl-NL" dirty="0" err="1"/>
+              <a:t>to</a:t>
+            </a:r>
+            <a:r>
+              <a:rPr lang="nl-NL" dirty="0"/>
+              <a:t> </a:t>
+            </a:r>
+            <a:r>
+              <a:rPr lang="nl-NL" dirty="0" err="1"/>
+              <a:t>learn</a:t>
+            </a:r>
+            <a:r>
+              <a:rPr lang="nl-NL" dirty="0"/>
+              <a:t>: </a:t>
+            </a:r>
+            <a:r>
+              <a:rPr lang="nl-NL" dirty="0" err="1"/>
+              <a:t>Angular</a:t>
+            </a:r>
+            <a:endParaRPr lang="nl-NL" dirty="0"/>
+          </a:p>
+          <a:p>
+            <a:r>
+              <a:rPr lang="nl-NL" dirty="0" err="1"/>
+              <a:t>Ecosystem</a:t>
+            </a:r>
+            <a:r>
+              <a:rPr lang="nl-NL" dirty="0"/>
+              <a:t>: </a:t>
+            </a:r>
+            <a:r>
+              <a:rPr lang="nl-NL" dirty="0" err="1"/>
+              <a:t>Angular</a:t>
+            </a:r>
+            <a:r>
+              <a:rPr lang="nl-NL" dirty="0"/>
+              <a:t> (cijfers zeggen anders, </a:t>
+            </a:r>
+            <a:r>
+              <a:rPr lang="nl-NL" dirty="0" err="1"/>
+              <a:t>react</a:t>
+            </a:r>
+            <a:r>
+              <a:rPr lang="nl-NL" dirty="0"/>
+              <a:t> 3x zo veel)</a:t>
+            </a:r>
+          </a:p>
+          <a:p>
+            <a:endParaRPr lang="nl-NL" dirty="0"/>
+          </a:p>
+          <a:p>
+            <a:r>
+              <a:rPr lang="nl-NL" dirty="0" err="1"/>
+              <a:t>Angular</a:t>
+            </a:r>
+            <a:r>
+              <a:rPr lang="nl-NL" dirty="0"/>
+              <a:t> wint (kwam door publiek)</a:t>
+            </a:r>
+          </a:p>
+          <a:p>
+            <a:endParaRPr lang="nl-NL" dirty="0"/>
+          </a:p>
+          <a:p>
+            <a:r>
+              <a:rPr lang="nl-NL" dirty="0"/>
+              <a:t>Met </a:t>
+            </a:r>
+            <a:r>
+              <a:rPr lang="nl-NL" dirty="0" err="1"/>
+              <a:t>react</a:t>
+            </a:r>
+            <a:r>
+              <a:rPr lang="nl-NL" dirty="0"/>
+              <a:t> moet je ook veel randzaken doen. </a:t>
+            </a:r>
+            <a:r>
+              <a:rPr lang="nl-NL" dirty="0" err="1"/>
+              <a:t>Angular</a:t>
+            </a:r>
+            <a:r>
+              <a:rPr lang="nl-NL" dirty="0"/>
+              <a:t> is completer</a:t>
+            </a:r>
+          </a:p>
+        </p:txBody>
+      </p:sp>
+      <p:pic>
+        <p:nvPicPr>
+          <p:cNvPr id="1028" name="Picture 4" descr="Afbeeldingsresultaat voor angular">
+            <a:extLst>
+              <a:ext uri="{FF2B5EF4-FFF2-40B4-BE49-F238E27FC236}">
+                <a16:creationId xmlns:a16="http://schemas.microsoft.com/office/drawing/2014/main" id="{2267E85D-2DBD-4F67-8BF2-3920DB9E175F}"/>
+              </a:ext>
+            </a:extLst>
+          </p:cNvPr>
+          <p:cNvPicPr>
+            <a:picLocks noChangeAspect="1" noChangeArrowheads="1"/>
+          </p:cNvPicPr>
+          <p:nvPr/>
+        </p:nvPicPr>
+        <p:blipFill>
+          <a:blip r:embed="rId2">
+            <a:extLst>
+              <a:ext uri="{28A0092B-C50C-407E-A947-70E740481C1C}">
+                <a14:useLocalDpi xmlns:a14="http://schemas.microsoft.com/office/drawing/2010/main" val="0"/>
+              </a:ext>
+            </a:extLst>
+          </a:blip>
+          <a:srcRect/>
+          <a:stretch>
+            <a:fillRect/>
+          </a:stretch>
+        </p:blipFill>
+        <p:spPr bwMode="auto">
+          <a:xfrm>
+            <a:off x="5337175" y="646114"/>
+            <a:ext cx="2381250" cy="2381250"/>
+          </a:xfrm>
+          <a:prstGeom prst="rect">
+            <a:avLst/>
+          </a:prstGeom>
+          <a:noFill/>
+          <a:extLst>
+            <a:ext uri="{909E8E84-426E-40DD-AFC4-6F175D3DCCD1}">
+              <a14:hiddenFill xmlns:a14="http://schemas.microsoft.com/office/drawing/2010/main">
+                <a:solidFill>
+                  <a:srgbClr val="FFFFFF"/>
+                </a:solidFill>
+              </a14:hiddenFill>
+            </a:ext>
+          </a:extLst>
+        </p:spPr>
+      </p:pic>
+      <p:pic>
+        <p:nvPicPr>
+          <p:cNvPr id="1030" name="Picture 6" descr="Afbeeldingsresultaat voor react">
+            <a:extLst>
+              <a:ext uri="{FF2B5EF4-FFF2-40B4-BE49-F238E27FC236}">
+                <a16:creationId xmlns:a16="http://schemas.microsoft.com/office/drawing/2014/main" id="{07208215-F457-4CC4-B4E9-01F8A2B292FE}"/>
+              </a:ext>
+            </a:extLst>
+          </p:cNvPr>
+          <p:cNvPicPr>
+            <a:picLocks noChangeAspect="1" noChangeArrowheads="1"/>
+          </p:cNvPicPr>
+          <p:nvPr/>
+        </p:nvPicPr>
+        <p:blipFill>
+          <a:blip r:embed="rId3" cstate="print">
+            <a:extLst>
+              <a:ext uri="{28A0092B-C50C-407E-A947-70E740481C1C}">
+                <a14:useLocalDpi xmlns:a14="http://schemas.microsoft.com/office/drawing/2010/main" val="0"/>
+              </a:ext>
+            </a:extLst>
+          </a:blip>
+          <a:srcRect/>
+          <a:stretch>
+            <a:fillRect/>
+          </a:stretch>
+        </p:blipFill>
+        <p:spPr bwMode="auto">
+          <a:xfrm>
+            <a:off x="4738688" y="3382960"/>
+            <a:ext cx="4003591" cy="2828926"/>
+          </a:xfrm>
+          <a:prstGeom prst="rect">
+            <a:avLst/>
+          </a:prstGeom>
+          <a:noFill/>
+          <a:extLst>
+            <a:ext uri="{909E8E84-426E-40DD-AFC4-6F175D3DCCD1}">
+              <a14:hiddenFill xmlns:a14="http://schemas.microsoft.com/office/drawing/2010/main">
+                <a:solidFill>
+                  <a:srgbClr val="FFFFFF"/>
+                </a:solidFill>
+              </a14:hiddenFill>
+            </a:ext>
+          </a:extLst>
+        </p:spPr>
+      </p:pic>
+    </p:spTree>
+    <p:extLst>
+      <p:ext uri="{BB962C8B-B14F-4D97-AF65-F5344CB8AC3E}">
+        <p14:creationId xmlns:p14="http://schemas.microsoft.com/office/powerpoint/2010/main" val="3049586818"/>
+      </p:ext>
+    </p:extLst>
+  </p:cSld>
+  <p:clrMapOvr>
+    <a:masterClrMapping/>
+  </p:clrMapOvr>
+</p:sld>
+</file>
+
+<file path=ppt/slides/slide9.xml><?xml version="1.0" encoding="utf-8"?>
 <p:sld xmlns:a="http://schemas.openxmlformats.org/drawingml/2006/main" xmlns:r="http://schemas.openxmlformats.org/officeDocument/2006/relationships" xmlns:p="http://schemas.openxmlformats.org/presentationml/2006/main">
   <p:cSld>
     <p:spTree>
@@ -46587,18 +47951,17 @@
           <a:lstStyle/>
           <a:p>
             <a:r>
-              <a:rPr lang="en-US" dirty="0" smtClean="0"/>
+              <a:rPr lang="en-US" dirty="0"/>
               <a:t>Top-5 </a:t>
             </a:r>
             <a:r>
-              <a:rPr lang="en-US" dirty="0" err="1" smtClean="0"/>
+              <a:rPr lang="en-US" dirty="0" err="1"/>
               <a:t>presentaties</a:t>
             </a:r>
             <a:r>
-              <a:rPr lang="en-US" dirty="0" smtClean="0"/>
+              <a:rPr lang="en-US" dirty="0"/>
               <a:t> </a:t>
             </a:r>
-            <a:endParaRPr lang="en-US" dirty="0"/>
           </a:p>
         </p:txBody>
       </p:sp>
@@ -46625,16 +47988,10 @@
           <a:lstStyle/>
           <a:p>
             <a:r>
-              <a:rPr lang="nl-NL" u="sng" dirty="0" smtClean="0">
-                <a:hlinkClick r:id="rId3"/>
-              </a:rPr>
-              <a:t>1. “CERN</a:t>
-            </a:r>
-            <a:r>
               <a:rPr lang="nl-NL" u="sng" dirty="0">
                 <a:hlinkClick r:id="rId3"/>
               </a:rPr>
-              <a:t>, </a:t>
+              <a:t>1. “CERN, </a:t>
             </a:r>
             <a:r>
               <a:rPr lang="nl-NL" u="sng" dirty="0" err="1">
@@ -46661,13 +48018,13 @@
               <a:t> IT </a:t>
             </a:r>
             <a:r>
-              <a:rPr lang="nl-NL" u="sng" dirty="0" err="1" smtClean="0">
+              <a:rPr lang="nl-NL" u="sng" dirty="0" err="1">
                 <a:hlinkClick r:id="rId3"/>
               </a:rPr>
               <a:t>Perspective</a:t>
             </a:r>
             <a:r>
-              <a:rPr lang="nl-NL" u="sng" dirty="0" smtClean="0">
+              <a:rPr lang="nl-NL" u="sng" dirty="0">
                 <a:hlinkClick r:id="rId3"/>
               </a:rPr>
               <a:t>” </a:t>
@@ -46675,41 +48032,41 @@
           </a:p>
           <a:p>
             <a:r>
-              <a:rPr lang="nl-NL" dirty="0" smtClean="0"/>
+              <a:rPr lang="nl-NL" dirty="0"/>
               <a:t>	</a:t>
             </a:r>
             <a:r>
-              <a:rPr lang="nl-NL" dirty="0" err="1" smtClean="0"/>
+              <a:rPr lang="nl-NL" dirty="0" err="1"/>
               <a:t>by</a:t>
             </a:r>
             <a:r>
-              <a:rPr lang="nl-NL" dirty="0" smtClean="0"/>
+              <a:rPr lang="nl-NL" dirty="0"/>
               <a:t> Derek </a:t>
             </a:r>
             <a:r>
-              <a:rPr lang="nl-NL" dirty="0" err="1" smtClean="0"/>
+              <a:rPr lang="nl-NL" dirty="0" err="1"/>
               <a:t>Mathieson</a:t>
             </a:r>
             <a:r>
-              <a:rPr lang="nl-NL" dirty="0" smtClean="0"/>
+              <a:rPr lang="nl-NL" dirty="0"/>
               <a:t>; 4.74 with 282 </a:t>
             </a:r>
             <a:r>
-              <a:rPr lang="nl-NL" dirty="0" err="1" smtClean="0"/>
+              <a:rPr lang="nl-NL" dirty="0" err="1"/>
               <a:t>votes</a:t>
             </a:r>
             <a:r>
-              <a:rPr lang="nl-NL" dirty="0" smtClean="0"/>
+              <a:rPr lang="nl-NL" dirty="0"/>
               <a:t>.</a:t>
             </a:r>
           </a:p>
           <a:p>
             <a:r>
-              <a:rPr lang="nl-NL" dirty="0" smtClean="0"/>
+              <a:rPr lang="nl-NL" dirty="0"/>
               <a:t>2. “</a:t>
             </a:r>
             <a:r>
-              <a:rPr lang="nl-NL" dirty="0" smtClean="0">
+              <a:rPr lang="nl-NL" dirty="0">
                 <a:hlinkClick r:id="rId4"/>
               </a:rPr>
               <a:t>(</a:t>
@@ -46748,19 +48105,18 @@
               <a:rPr lang="nl-NL" dirty="0"/>
               <a:t>” </a:t>
             </a:r>
-            <a:endParaRPr lang="nl-NL" dirty="0" smtClean="0"/>
           </a:p>
           <a:p>
             <a:r>
-              <a:rPr lang="nl-NL" dirty="0" smtClean="0"/>
+              <a:rPr lang="nl-NL" dirty="0"/>
               <a:t>	</a:t>
             </a:r>
             <a:r>
-              <a:rPr lang="nl-NL" dirty="0" err="1" smtClean="0"/>
+              <a:rPr lang="nl-NL" dirty="0" err="1"/>
               <a:t>by</a:t>
             </a:r>
             <a:r>
-              <a:rPr lang="nl-NL" dirty="0" smtClean="0"/>
+              <a:rPr lang="nl-NL" dirty="0"/>
               <a:t> </a:t>
             </a:r>
             <a:r>
@@ -46785,33 +48141,24 @@
             </a:r>
             <a:r>
               <a:rPr lang="nl-NL" dirty="0"/>
-              <a:t> </a:t>
+              <a:t> Kubiak; 4.74 with 114 </a:t>
             </a:r>
             <a:r>
-              <a:rPr lang="nl-NL" dirty="0" smtClean="0"/>
-              <a:t>Kubiak; 4.74 </a:t>
+              <a:rPr lang="nl-NL" dirty="0" err="1"/>
+              <a:t>votes</a:t>
             </a:r>
             <a:r>
               <a:rPr lang="nl-NL" dirty="0"/>
-              <a:t>with 114 </a:t>
-            </a:r>
-            <a:r>
-              <a:rPr lang="nl-NL" dirty="0" err="1" smtClean="0"/>
-              <a:t>votes</a:t>
-            </a:r>
-            <a:r>
-              <a:rPr lang="nl-NL" dirty="0" smtClean="0"/>
               <a:t>.</a:t>
             </a:r>
-            <a:endParaRPr lang="nl-NL" dirty="0"/>
           </a:p>
           <a:p>
             <a:r>
-              <a:rPr lang="nl-NL" dirty="0" smtClean="0"/>
+              <a:rPr lang="nl-NL" dirty="0"/>
               <a:t>3. “</a:t>
             </a:r>
             <a:r>
-              <a:rPr lang="nl-NL" dirty="0" smtClean="0">
+              <a:rPr lang="nl-NL" dirty="0">
                 <a:hlinkClick r:id="rId5"/>
               </a:rPr>
               <a:t>Parallel </a:t>
@@ -46838,28 +48185,22 @@
               <a:rPr lang="nl-NL" dirty="0">
                 <a:hlinkClick r:id="rId5"/>
               </a:rPr>
-              <a:t> Programming with </a:t>
+              <a:t> Programming with Streams </a:t>
             </a:r>
             <a:r>
-              <a:rPr lang="nl-NL" dirty="0" smtClean="0">
-                <a:hlinkClick r:id="rId5"/>
-              </a:rPr>
-              <a:t>Streams </a:t>
-            </a:r>
-            <a:r>
-              <a:rPr lang="nl-NL" dirty="0" err="1" smtClean="0">
+              <a:rPr lang="nl-NL" dirty="0" err="1">
                 <a:hlinkClick r:id="rId5"/>
               </a:rPr>
               <a:t>and</a:t>
             </a:r>
             <a:r>
-              <a:rPr lang="nl-NL" dirty="0" smtClean="0">
+              <a:rPr lang="nl-NL" dirty="0">
                 <a:hlinkClick r:id="rId5"/>
               </a:rPr>
               <a:t>   </a:t>
             </a:r>
             <a:r>
-              <a:rPr lang="nl-NL" dirty="0" err="1" smtClean="0">
+              <a:rPr lang="nl-NL" dirty="0" err="1">
                 <a:hlinkClick r:id="rId5"/>
               </a:rPr>
               <a:t>CompletableFuture</a:t>
@@ -46868,7 +48209,6 @@
               <a:rPr lang="nl-NL" dirty="0"/>
               <a:t>” </a:t>
             </a:r>
-            <a:endParaRPr lang="nl-NL" dirty="0" smtClean="0"/>
           </a:p>
           <a:p>
             <a:r>
@@ -46876,11 +48216,11 @@
               <a:t>	</a:t>
             </a:r>
             <a:r>
-              <a:rPr lang="nl-NL" dirty="0" err="1" smtClean="0"/>
+              <a:rPr lang="nl-NL" dirty="0" err="1"/>
               <a:t>by</a:t>
             </a:r>
             <a:r>
-              <a:rPr lang="nl-NL" dirty="0" smtClean="0"/>
+              <a:rPr lang="nl-NL" dirty="0"/>
               <a:t> </a:t>
             </a:r>
             <a:r>
@@ -46892,43 +48232,32 @@
               <a:t> </a:t>
             </a:r>
             <a:r>
-              <a:rPr lang="nl-NL" dirty="0" err="1" smtClean="0"/>
+              <a:rPr lang="nl-NL" dirty="0" err="1"/>
               <a:t>Subramaniam</a:t>
             </a:r>
             <a:r>
-              <a:rPr lang="nl-NL" dirty="0" smtClean="0"/>
-              <a:t>; 4.73 </a:t>
+              <a:rPr lang="nl-NL" dirty="0"/>
+              <a:t>; 4.73 with 215 </a:t>
+            </a:r>
+            <a:r>
+              <a:rPr lang="nl-NL" dirty="0" err="1"/>
+              <a:t>votes</a:t>
             </a:r>
             <a:r>
               <a:rPr lang="nl-NL" dirty="0"/>
-              <a:t>with 215 </a:t>
-            </a:r>
-            <a:r>
-              <a:rPr lang="nl-NL" dirty="0" err="1" smtClean="0"/>
-              <a:t>votes</a:t>
-            </a:r>
-            <a:r>
-              <a:rPr lang="nl-NL" dirty="0" smtClean="0"/>
               <a:t>.</a:t>
             </a:r>
-            <a:endParaRPr lang="nl-NL" dirty="0"/>
           </a:p>
           <a:p>
             <a:r>
-              <a:rPr lang="nl-NL" dirty="0" smtClean="0"/>
+              <a:rPr lang="nl-NL" dirty="0"/>
               <a:t>4. “</a:t>
-            </a:r>
-            <a:r>
-              <a:rPr lang="nl-NL" dirty="0" smtClean="0">
-                <a:hlinkClick r:id="rId6"/>
-              </a:rPr>
-              <a:t>Blue </a:t>
             </a:r>
             <a:r>
               <a:rPr lang="nl-NL" dirty="0">
                 <a:hlinkClick r:id="rId6"/>
               </a:rPr>
-              <a:t>Team Security. </a:t>
+              <a:t>Blue Team Security. </a:t>
             </a:r>
             <a:r>
               <a:rPr lang="nl-NL" dirty="0" err="1">
@@ -46970,19 +48299,18 @@
               <a:rPr lang="nl-NL" dirty="0"/>
               <a:t>” </a:t>
             </a:r>
-            <a:endParaRPr lang="nl-NL" dirty="0" smtClean="0"/>
           </a:p>
           <a:p>
             <a:r>
-              <a:rPr lang="nl-NL" dirty="0" smtClean="0"/>
+              <a:rPr lang="nl-NL" dirty="0"/>
               <a:t>	</a:t>
             </a:r>
             <a:r>
-              <a:rPr lang="nl-NL" dirty="0" err="1" smtClean="0"/>
+              <a:rPr lang="nl-NL" dirty="0" err="1"/>
               <a:t>by</a:t>
             </a:r>
             <a:r>
-              <a:rPr lang="nl-NL" dirty="0" smtClean="0"/>
+              <a:rPr lang="nl-NL" dirty="0"/>
               <a:t> </a:t>
             </a:r>
             <a:r>
@@ -46994,34 +48322,29 @@
               <a:t> </a:t>
             </a:r>
             <a:r>
-              <a:rPr lang="nl-NL" dirty="0" err="1" smtClean="0"/>
+              <a:rPr lang="nl-NL" dirty="0" err="1"/>
               <a:t>Hofvander</a:t>
             </a:r>
             <a:r>
-              <a:rPr lang="nl-NL" dirty="0" smtClean="0"/>
-              <a:t>; 4.71 </a:t>
+              <a:rPr lang="nl-NL" dirty="0"/>
+              <a:t>; 4.71 with 86 </a:t>
+            </a:r>
+            <a:r>
+              <a:rPr lang="nl-NL" dirty="0" err="1"/>
+              <a:t>votes</a:t>
             </a:r>
             <a:r>
               <a:rPr lang="nl-NL" dirty="0"/>
-              <a:t>with 86 </a:t>
-            </a:r>
-            <a:r>
-              <a:rPr lang="nl-NL" dirty="0" err="1" smtClean="0"/>
-              <a:t>votes</a:t>
-            </a:r>
-            <a:r>
-              <a:rPr lang="nl-NL" dirty="0" smtClean="0"/>
               <a:t>.</a:t>
             </a:r>
-            <a:endParaRPr lang="nl-NL" dirty="0"/>
           </a:p>
           <a:p>
             <a:r>
-              <a:rPr lang="nl-NL" dirty="0" smtClean="0"/>
+              <a:rPr lang="nl-NL" dirty="0"/>
               <a:t>5. “</a:t>
             </a:r>
             <a:r>
-              <a:rPr lang="nl-NL" dirty="0" smtClean="0">
+              <a:rPr lang="nl-NL" dirty="0">
                 <a:hlinkClick r:id="rId7"/>
               </a:rPr>
               <a:t>Next </a:t>
@@ -47072,50 +48395,31 @@
               <a:rPr lang="nl-NL" dirty="0"/>
               <a:t>” </a:t>
             </a:r>
-            <a:endParaRPr lang="nl-NL" dirty="0" smtClean="0"/>
           </a:p>
           <a:p>
             <a:r>
-              <a:rPr lang="nl-NL" dirty="0" smtClean="0"/>
+              <a:rPr lang="nl-NL" dirty="0"/>
               <a:t>	</a:t>
             </a:r>
             <a:r>
-              <a:rPr lang="nl-NL" dirty="0" err="1" smtClean="0"/>
+              <a:rPr lang="nl-NL" dirty="0" err="1"/>
               <a:t>by</a:t>
             </a:r>
             <a:r>
-              <a:rPr lang="nl-NL" dirty="0" smtClean="0"/>
-              <a:t> </a:t>
+              <a:rPr lang="nl-NL" dirty="0"/>
+              <a:t> Jonathan Mills; 4.69 with 29 </a:t>
+            </a:r>
+            <a:r>
+              <a:rPr lang="nl-NL" dirty="0" err="1"/>
+              <a:t>votes</a:t>
             </a:r>
             <a:r>
               <a:rPr lang="nl-NL" dirty="0"/>
-              <a:t>Jonathan </a:t>
-            </a:r>
-            <a:r>
-              <a:rPr lang="nl-NL" dirty="0" smtClean="0"/>
-              <a:t>Mills; 4.69 </a:t>
-            </a:r>
-            <a:r>
-              <a:rPr lang="nl-NL" dirty="0"/>
-              <a:t>with 29 </a:t>
-            </a:r>
-            <a:r>
-              <a:rPr lang="nl-NL" dirty="0" err="1" smtClean="0"/>
-              <a:t>votes</a:t>
-            </a:r>
-            <a:r>
-              <a:rPr lang="nl-NL" dirty="0" smtClean="0"/>
               <a:t>.</a:t>
             </a:r>
-            <a:endParaRPr lang="nl-NL" dirty="0"/>
           </a:p>
           <a:p>
-            <a:endParaRPr lang="nl-NL" dirty="0" smtClean="0">
-              <a:hlinkClick r:id="rId8"/>
-            </a:endParaRPr>
-          </a:p>
-          <a:p>
-            <a:endParaRPr lang="nl-NL" dirty="0" smtClean="0">
+            <a:endParaRPr lang="nl-NL" dirty="0">
               <a:hlinkClick r:id="rId8"/>
             </a:endParaRPr>
           </a:p>
@@ -47125,90 +48429,11 @@
             </a:endParaRPr>
           </a:p>
           <a:p>
-            <a:endParaRPr lang="en-US" dirty="0" smtClean="0"/>
+            <a:endParaRPr lang="nl-NL" dirty="0">
+              <a:hlinkClick r:id="rId8"/>
+            </a:endParaRPr>
           </a:p>
-        </p:txBody>
-      </p:sp>
-      <p:sp>
-        <p:nvSpPr>
-          <p:cNvPr id="5" name="Slide Number Placeholder 4"/>
-          <p:cNvSpPr>
-            <a:spLocks noGrp="1"/>
-          </p:cNvSpPr>
-          <p:nvPr>
-            <p:ph type="sldNum" sz="quarter" idx="12"/>
-          </p:nvPr>
-        </p:nvSpPr>
-        <p:spPr/>
-        <p:txBody>
-          <a:bodyPr/>
-          <a:lstStyle/>
           <a:p>
-            <a:fld id="{525A3C56-E491-49B2-93F3-63532DF516BC}" type="slidenum">
-              <a:rPr lang="en-US" smtClean="0"/>
-              <a:pPr/>
-              <a:t>5</a:t>
-            </a:fld>
-            <a:endParaRPr lang="en-US" dirty="0"/>
-          </a:p>
-        </p:txBody>
-      </p:sp>
-    </p:spTree>
-    <p:extLst>
-      <p:ext uri="{BB962C8B-B14F-4D97-AF65-F5344CB8AC3E}">
-        <p14:creationId xmlns:p14="http://schemas.microsoft.com/office/powerpoint/2010/main" val="2670441715"/>
-      </p:ext>
-    </p:extLst>
-  </p:cSld>
-  <p:clrMapOvr>
-    <a:masterClrMapping/>
-  </p:clrMapOvr>
-  <p:timing>
-    <p:tnLst>
-      <p:par>
-        <p:cTn id="1" dur="indefinite" restart="never" nodeType="tmRoot"/>
-      </p:par>
-    </p:tnLst>
-  </p:timing>
-</p:sld>
-</file>
-
-<file path=ppt/slides/slide6.xml><?xml version="1.0" encoding="utf-8"?>
-<p:sld xmlns:a="http://schemas.openxmlformats.org/drawingml/2006/main" xmlns:r="http://schemas.openxmlformats.org/officeDocument/2006/relationships" xmlns:p="http://schemas.openxmlformats.org/presentationml/2006/main">
-  <p:cSld>
-    <p:spTree>
-      <p:nvGrpSpPr>
-        <p:cNvPr id="1" name=""/>
-        <p:cNvGrpSpPr/>
-        <p:nvPr/>
-      </p:nvGrpSpPr>
-      <p:grpSpPr>
-        <a:xfrm>
-          <a:off x="0" y="0"/>
-          <a:ext cx="0" cy="0"/>
-          <a:chOff x="0" y="0"/>
-          <a:chExt cx="0" cy="0"/>
-        </a:xfrm>
-      </p:grpSpPr>
-      <p:sp>
-        <p:nvSpPr>
-          <p:cNvPr id="2" name="Title 1"/>
-          <p:cNvSpPr>
-            <a:spLocks noGrp="1"/>
-          </p:cNvSpPr>
-          <p:nvPr>
-            <p:ph type="title"/>
-          </p:nvPr>
-        </p:nvSpPr>
-        <p:spPr/>
-        <p:txBody>
-          <a:bodyPr/>
-          <a:lstStyle/>
-          <a:p>
-            <a:r>
-              <a:rPr lang="en-US" dirty="0" smtClean="0"/>
-              <a:t>Online content</a:t>
-            </a:r>
             <a:endParaRPr lang="en-US" dirty="0"/>
           </a:p>
         </p:txBody>
@@ -47231,284 +48456,16 @@
             <a:fld id="{525A3C56-E491-49B2-93F3-63532DF516BC}" type="slidenum">
               <a:rPr lang="en-US" smtClean="0"/>
               <a:pPr/>
-              <a:t>6</a:t>
+              <a:t>9</a:t>
             </a:fld>
             <a:endParaRPr lang="en-US" dirty="0"/>
-          </a:p>
-        </p:txBody>
-      </p:sp>
-      <p:sp>
-        <p:nvSpPr>
-          <p:cNvPr id="4" name="Tijdelijke aanduiding voor inhoud 3"/>
-          <p:cNvSpPr>
-            <a:spLocks noGrp="1"/>
-          </p:cNvSpPr>
-          <p:nvPr>
-            <p:ph sz="quarter" idx="17"/>
-          </p:nvPr>
-        </p:nvSpPr>
-        <p:spPr>
-          <a:xfrm>
-            <a:off x="449264" y="1266825"/>
-            <a:ext cx="8336010" cy="4886325"/>
-          </a:xfrm>
-        </p:spPr>
-        <p:txBody>
-          <a:bodyPr/>
-          <a:lstStyle/>
-          <a:p>
-            <a:r>
-              <a:rPr lang="nl-NL" dirty="0" smtClean="0"/>
-              <a:t>Alle links nog even kort van Koos en Ronald</a:t>
-            </a:r>
-            <a:endParaRPr lang="nl-NL" dirty="0">
-              <a:hlinkClick r:id="rId3"/>
-            </a:endParaRPr>
-          </a:p>
-          <a:p>
-            <a:endParaRPr lang="nl-NL" dirty="0" smtClean="0">
-              <a:hlinkClick r:id="rId3"/>
-            </a:endParaRPr>
-          </a:p>
-          <a:p>
-            <a:pPr marL="342900" indent="-342900">
-              <a:buFontTx/>
-              <a:buChar char="-"/>
-            </a:pPr>
-            <a:r>
-              <a:rPr lang="nl-NL" dirty="0" err="1" smtClean="0">
-                <a:hlinkClick r:id="rId3"/>
-              </a:rPr>
-              <a:t>Youtube</a:t>
-            </a:r>
-            <a:r>
-              <a:rPr lang="nl-NL" dirty="0" smtClean="0">
-                <a:hlinkClick r:id="rId3"/>
-              </a:rPr>
-              <a:t> </a:t>
-            </a:r>
-            <a:r>
-              <a:rPr lang="nl-NL" dirty="0" err="1">
-                <a:hlinkClick r:id="rId3"/>
-              </a:rPr>
-              <a:t>channel</a:t>
-            </a:r>
-            <a:r>
-              <a:rPr lang="nl-NL" dirty="0">
-                <a:hlinkClick r:id="rId3"/>
-              </a:rPr>
-              <a:t> </a:t>
-            </a:r>
-            <a:r>
-              <a:rPr lang="nl-NL" dirty="0" err="1" smtClean="0">
-                <a:hlinkClick r:id="rId3"/>
-              </a:rPr>
-              <a:t>Devoxx</a:t>
-            </a:r>
-            <a:r>
-              <a:rPr lang="nl-NL" dirty="0" smtClean="0">
-                <a:hlinkClick r:id="rId3"/>
-              </a:rPr>
-              <a:t> 2017</a:t>
-            </a:r>
-            <a:r>
-              <a:rPr lang="nl-NL" dirty="0" smtClean="0"/>
-              <a:t> </a:t>
-            </a:r>
-          </a:p>
-          <a:p>
-            <a:r>
-              <a:rPr lang="nl-NL" dirty="0" smtClean="0"/>
-              <a:t>	bevat alle presentaties van 2017</a:t>
-            </a:r>
-          </a:p>
-          <a:p>
-            <a:pPr marL="342900" indent="-342900">
-              <a:buFontTx/>
-              <a:buChar char="-"/>
-            </a:pPr>
-            <a:r>
-              <a:rPr lang="nl-NL" dirty="0" smtClean="0">
-                <a:hlinkClick r:id="rId4"/>
-              </a:rPr>
-              <a:t>Top-100 </a:t>
-            </a:r>
-            <a:r>
-              <a:rPr lang="nl-NL" dirty="0" err="1" smtClean="0">
-                <a:hlinkClick r:id="rId4"/>
-              </a:rPr>
-              <a:t>Devoxx</a:t>
-            </a:r>
-            <a:r>
-              <a:rPr lang="nl-NL" dirty="0" smtClean="0">
-                <a:hlinkClick r:id="rId4"/>
-              </a:rPr>
-              <a:t> 2017</a:t>
-            </a:r>
-            <a:endParaRPr lang="nl-NL" dirty="0" smtClean="0"/>
-          </a:p>
-          <a:p>
-            <a:pPr lvl="2" indent="0">
-              <a:buNone/>
-            </a:pPr>
-            <a:r>
-              <a:rPr lang="nl-NL" dirty="0" smtClean="0"/>
-              <a:t>	top-100 op basis van de rating van het publiek (inclusief links)</a:t>
-            </a:r>
-            <a:endParaRPr lang="nl-NL" dirty="0"/>
           </a:p>
         </p:txBody>
       </p:sp>
     </p:spTree>
     <p:extLst>
       <p:ext uri="{BB962C8B-B14F-4D97-AF65-F5344CB8AC3E}">
-        <p14:creationId xmlns:p14="http://schemas.microsoft.com/office/powerpoint/2010/main" val="2997554915"/>
-      </p:ext>
-    </p:extLst>
-  </p:cSld>
-  <p:clrMapOvr>
-    <a:masterClrMapping/>
-  </p:clrMapOvr>
-  <p:timing>
-    <p:tnLst>
-      <p:par>
-        <p:cTn id="1" dur="indefinite" restart="never" nodeType="tmRoot"/>
-      </p:par>
-    </p:tnLst>
-  </p:timing>
-</p:sld>
-</file>
-
-<file path=ppt/slides/slide7.xml><?xml version="1.0" encoding="utf-8"?>
-<p:sld xmlns:a="http://schemas.openxmlformats.org/drawingml/2006/main" xmlns:r="http://schemas.openxmlformats.org/officeDocument/2006/relationships" xmlns:p="http://schemas.openxmlformats.org/presentationml/2006/main">
-  <p:cSld>
-    <p:spTree>
-      <p:nvGrpSpPr>
-        <p:cNvPr id="1" name=""/>
-        <p:cNvGrpSpPr/>
-        <p:nvPr/>
-      </p:nvGrpSpPr>
-      <p:grpSpPr>
-        <a:xfrm>
-          <a:off x="0" y="0"/>
-          <a:ext cx="0" cy="0"/>
-          <a:chOff x="0" y="0"/>
-          <a:chExt cx="0" cy="0"/>
-        </a:xfrm>
-      </p:grpSpPr>
-      <p:pic>
-        <p:nvPicPr>
-          <p:cNvPr id="3" name="Afbeelding 2"/>
-          <p:cNvPicPr>
-            <a:picLocks noChangeAspect="1"/>
-          </p:cNvPicPr>
-          <p:nvPr/>
-        </p:nvPicPr>
-        <p:blipFill>
-          <a:blip r:embed="rId2" cstate="print">
-            <a:extLst>
-              <a:ext uri="{28A0092B-C50C-407E-A947-70E740481C1C}">
-                <a14:useLocalDpi xmlns:a14="http://schemas.microsoft.com/office/drawing/2010/main" val="0"/>
-              </a:ext>
-            </a:extLst>
-          </a:blip>
-          <a:stretch>
-            <a:fillRect/>
-          </a:stretch>
-        </p:blipFill>
-        <p:spPr>
-          <a:xfrm>
-            <a:off x="1716259" y="1561515"/>
-            <a:ext cx="5054991" cy="3791243"/>
-          </a:xfrm>
-          <a:prstGeom prst="rect">
-            <a:avLst/>
-          </a:prstGeom>
-        </p:spPr>
-      </p:pic>
-      <p:sp>
-        <p:nvSpPr>
-          <p:cNvPr id="4" name="Tekstvak 3"/>
-          <p:cNvSpPr txBox="1"/>
-          <p:nvPr/>
-        </p:nvSpPr>
-        <p:spPr bwMode="auto">
-          <a:xfrm>
-            <a:off x="407964" y="203982"/>
-            <a:ext cx="8159262" cy="1107996"/>
-          </a:xfrm>
-          <a:prstGeom prst="rect">
-            <a:avLst/>
-          </a:prstGeom>
-          <a:noFill/>
-          <a:ln w="9525" algn="ctr">
-            <a:noFill/>
-            <a:miter lim="800000"/>
-            <a:headEnd/>
-            <a:tailEnd/>
-          </a:ln>
-          <a:effectLst/>
-        </p:spPr>
-        <p:txBody>
-          <a:bodyPr wrap="square" lIns="0" tIns="0" rIns="0" bIns="0" rtlCol="0">
-            <a:spAutoFit/>
-          </a:bodyPr>
-          <a:lstStyle/>
-          <a:p>
-            <a:r>
-              <a:rPr lang="nl-NL" dirty="0" smtClean="0">
-                <a:cs typeface="Arial" pitchFamily="34" charset="0"/>
-              </a:rPr>
-              <a:t>Misschien even afsluiten met dat je zo </a:t>
-            </a:r>
-            <a:r>
-              <a:rPr lang="nl-NL" dirty="0" smtClean="0">
-                <a:cs typeface="Arial" pitchFamily="34" charset="0"/>
-              </a:rPr>
-              <a:t>snel mensen leert kennen. Samen in de kroeg staan met gelijkgestemden is gezellig en interessant . </a:t>
-            </a:r>
-          </a:p>
-          <a:p>
-            <a:r>
-              <a:rPr lang="nl-NL" dirty="0" smtClean="0">
-                <a:cs typeface="Arial" pitchFamily="34" charset="0"/>
-              </a:rPr>
-              <a:t>Op de foto spontaan met 12 man in </a:t>
-            </a:r>
-            <a:r>
-              <a:rPr lang="nl-NL" dirty="0" err="1" smtClean="0">
-                <a:cs typeface="Arial" pitchFamily="34" charset="0"/>
-              </a:rPr>
-              <a:t>pizzaria</a:t>
-            </a:r>
-            <a:r>
-              <a:rPr lang="nl-NL" dirty="0" smtClean="0">
-                <a:cs typeface="Arial" pitchFamily="34" charset="0"/>
-              </a:rPr>
-              <a:t> van CGI, DUO, </a:t>
-            </a:r>
-            <a:r>
-              <a:rPr lang="nl-NL" dirty="0" err="1" smtClean="0">
-                <a:cs typeface="Arial" pitchFamily="34" charset="0"/>
-              </a:rPr>
-              <a:t>Maven</a:t>
-            </a:r>
-            <a:r>
-              <a:rPr lang="nl-NL" dirty="0" smtClean="0">
-                <a:cs typeface="Arial" pitchFamily="34" charset="0"/>
-              </a:rPr>
-              <a:t> + (waar waren die achtersten van?)</a:t>
-            </a:r>
-            <a:endParaRPr lang="nl-NL" dirty="0" smtClean="0">
-              <a:cs typeface="Arial" pitchFamily="34" charset="0"/>
-            </a:endParaRPr>
-          </a:p>
-        </p:txBody>
-      </p:sp>
-    </p:spTree>
-    <p:extLst>
-      <p:ext uri="{BB962C8B-B14F-4D97-AF65-F5344CB8AC3E}">
-        <p14:creationId xmlns:p14="http://schemas.microsoft.com/office/powerpoint/2010/main" val="3014988699"/>
+        <p14:creationId xmlns:p14="http://schemas.microsoft.com/office/powerpoint/2010/main" val="2670441715"/>
       </p:ext>
     </p:extLst>
   </p:cSld>
@@ -48446,196 +49403,6 @@
 </file>
 
 <file path=customXml/item2.xml><?xml version="1.0" encoding="utf-8"?>
-<p:properties xmlns:p="http://schemas.microsoft.com/office/2006/metadata/properties" xmlns:xsi="http://www.w3.org/2001/XMLSchema-instance">
-  <documentManagement>
-    <c5aebc35b3e840e5912c276ffe755dcf xmlns="d95a5b16-1b8d-4c7c-9ebf-89c0983b6970">
-      <Terms xmlns="http://schemas.microsoft.com/office/infopath/2007/PartnerControls"/>
-    </c5aebc35b3e840e5912c276ffe755dcf>
-    <c79d12643ffc4d60ab657aaa1718cc32 xmlns="d95a5b16-1b8d-4c7c-9ebf-89c0983b6970">
-      <Terms xmlns="http://schemas.microsoft.com/office/infopath/2007/PartnerControls">
-        <TermInfo xmlns="http://schemas.microsoft.com/office/infopath/2007/PartnerControls">
-          <TermName xmlns="http://schemas.microsoft.com/office/infopath/2007/PartnerControls">Global</TermName>
-          <TermId xmlns="http://schemas.microsoft.com/office/infopath/2007/PartnerControls">43ac7042-3752-4f1b-8a93-43b36e65d3e5</TermId>
-        </TermInfo>
-      </Terms>
-    </c79d12643ffc4d60ab657aaa1718cc32>
-    <p43f7bb208e443c9b50eb304fe6606a3 xmlns="d95a5b16-1b8d-4c7c-9ebf-89c0983b6970">
-      <Terms xmlns="http://schemas.microsoft.com/office/infopath/2007/PartnerControls"/>
-    </p43f7bb208e443c9b50eb304fe6606a3>
-    <TaxCatchAll xmlns="d95a5b16-1b8d-4c7c-9ebf-89c0983b6970">
-      <Value>260</Value>
-    </TaxCatchAll>
-    <h4c66fbf292e4125b0e390af25f11c04 xmlns="d95a5b16-1b8d-4c7c-9ebf-89c0983b6970">
-      <Terms xmlns="http://schemas.microsoft.com/office/infopath/2007/PartnerControls"/>
-    </h4c66fbf292e4125b0e390af25f11c04>
-    <eafb632c3f5c40ba98242be6bbd6bb17 xmlns="d95a5b16-1b8d-4c7c-9ebf-89c0983b6970">
-      <Terms xmlns="http://schemas.microsoft.com/office/infopath/2007/PartnerControls"/>
-    </eafb632c3f5c40ba98242be6bbd6bb17>
-    <Creator xmlns="d95a5b16-1b8d-4c7c-9ebf-89c0983b6970" xsi:nil="true"/>
-    <Language xmlns="http://schemas.microsoft.com/sharepoint/v3">EN</Language>
-    <Abstract xmlns="d95a5b16-1b8d-4c7c-9ebf-89c0983b6970">CGI-beet-option_EN</Abstract>
-    <External_x0020_Use xmlns="d95a5b16-1b8d-4c7c-9ebf-89c0983b6970">No</External_x0020_Use>
-    <Owner_x0020_Organisation xmlns="d95a5b16-1b8d-4c7c-9ebf-89c0983b6970">Group</Owner_x0020_Organisation>
-    <BS_x0020_Document_x0020_Sub_x0020_Type xmlns="d95a5b16-1b8d-4c7c-9ebf-89c0983b6970">Pro Forma</BS_x0020_Document_x0020_Sub_x0020_Type>
-    <Market xmlns="d95a5b16-1b8d-4c7c-9ebf-89c0983b6970"/>
-    <Best_x0020_Before_x0020_Date xmlns="d95a5b16-1b8d-4c7c-9ebf-89c0983b6970">2020-08-28T23:00:00+00:00</Best_x0020_Before_x0020_Date>
-    <Published_x0020_By xmlns="d95a5b16-1b8d-4c7c-9ebf-89c0983b6970">
-      <UserInfo>
-        <DisplayName>Stiller, Regina C</DisplayName>
-        <AccountId>55167</AccountId>
-        <AccountType/>
-      </UserInfo>
-    </Published_x0020_By>
-    <Publication_x0020_Date xmlns="d95a5b16-1b8d-4c7c-9ebf-89c0983b6970">2015-08-28T23:00:00+00:00</Publication_x0020_Date>
-    <Geographic_x0020_Region xmlns="d95a5b16-1b8d-4c7c-9ebf-89c0983b6970"/>
-    <TaxKeywordTaxHTField xmlns="d95a5b16-1b8d-4c7c-9ebf-89c0983b6970">
-      <Terms xmlns="http://schemas.microsoft.com/office/infopath/2007/PartnerControls"/>
-    </TaxKeywordTaxHTField>
-    <b0f7c43cb32a4bb99696cc0157e407bc xmlns="d95a5b16-1b8d-4c7c-9ebf-89c0983b6970">
-      <Terms xmlns="http://schemas.microsoft.com/office/infopath/2007/PartnerControls"/>
-    </b0f7c43cb32a4bb99696cc0157e407bc>
-    <CSMeta2010Field xmlns="http://schemas.microsoft.com/sharepoint/v3">a1a8a2be-0578-4c61-8abd-6dccca5e33fd;2017-08-30 20:15:33;AUTOCLASSIFIED;Business theme:2017-08-30 20:15:33|False||AUTOCLASSIFIED|2017-08-30 20:15:33|UNDEFINED|943f7bb2-08e4-43c9-b50e-b304fe6606a3;Organization:2017-08-30 20:15:33|False||AUTOCLASSIFIED|2017-08-30 20:15:33|UNDEFINED|c79d1264-3ffc-4d60-ab65-7aaa1718cc32;Sector:2017-08-30 20:15:33|False||AUTOCLASSIFIED|2017-08-30 20:15:33|UNDEFINED|c5aebc35-b3e8-40e5-912c-276ffe755dcf;Proposition:2017-08-30 20:15:33|False||AUTOCLASSIFIED|2017-08-30 20:15:33|UNDEFINED|14c66fbf-292e-4125-b0e3-90af25f11c04;Service line:2017-08-30 20:15:33|False||AUTOCLASSIFIED|2017-08-30 20:15:33|UNDEFINED|eafb632c-3f5c-40ba-9824-2be6bbd6bb17;Business Practice:2017-08-30 20:15:33|False||AUTOCLASSIFIED|2017-08-30 20:15:33|UNDEFINED|b0f7c43c-b32a-4bb9-9696-cc0157e407bc;False</CSMeta2010Field>
-  </documentManagement>
-</p:properties>
-</file>
-
-<file path=customXml/item3.xml><?xml version="1.0" encoding="utf-8"?>
-<?mso-contentType ?>
-<spe:Receivers xmlns:spe="http://schemas.microsoft.com/sharepoint/events">
-  <Receiver>
-    <Name>ItemUpdatedEventHandlerForConceptSearch</Name>
-    <Synchronization>Default</Synchronization>
-    <Type>10002</Type>
-    <SequenceNumber>10001</SequenceNumber>
-    <Assembly>conceptSearching.Sharepoint.ContentTypes, Version=1.0.0.0, Culture=neutral, PublicKeyToken=858f8f13980e4745</Assembly>
-    <Class>conceptSearching.Sharepoint.ContentTypes.CSHandleEvent</Class>
-    <Data/>
-    <Filter/>
-  </Receiver>
-  <Receiver>
-    <Name>ItemCheckedInEventHandlerForConceptSearch</Name>
-    <Synchronization>Default</Synchronization>
-    <Type>10004</Type>
-    <SequenceNumber>10002</SequenceNumber>
-    <Assembly>conceptSearching.Sharepoint.ContentTypes, Version=1.0.0.0, Culture=neutral, PublicKeyToken=858f8f13980e4745</Assembly>
-    <Class>conceptSearching.Sharepoint.ContentTypes.CSHandleEvent</Class>
-    <Data/>
-    <Filter/>
-  </Receiver>
-  <Receiver>
-    <Name>ItemUncheckedOutEventHandlerForConceptSearch</Name>
-    <Synchronization>Default</Synchronization>
-    <Type>10006</Type>
-    <SequenceNumber>10003</SequenceNumber>
-    <Assembly>conceptSearching.Sharepoint.ContentTypes, Version=1.0.0.0, Culture=neutral, PublicKeyToken=858f8f13980e4745</Assembly>
-    <Class>conceptSearching.Sharepoint.ContentTypes.CSHandleEvent</Class>
-    <Data/>
-    <Filter/>
-  </Receiver>
-  <Receiver>
-    <Name>ItemAddedEventHandlerForConceptSearch</Name>
-    <Synchronization>Default</Synchronization>
-    <Type>10001</Type>
-    <SequenceNumber>10004</SequenceNumber>
-    <Assembly>conceptSearching.Sharepoint.ContentTypes, Version=1.0.0.0, Culture=neutral, PublicKeyToken=858f8f13980e4745</Assembly>
-    <Class>conceptSearching.Sharepoint.ContentTypes.CSHandleEvent</Class>
-    <Data/>
-    <Filter/>
-  </Receiver>
-  <Receiver>
-    <Name>ItemFileMovedEventHandlerForConceptSearch</Name>
-    <Synchronization>Default</Synchronization>
-    <Type>10009</Type>
-    <SequenceNumber>10005</SequenceNumber>
-    <Assembly>conceptSearching.Sharepoint.ContentTypes, Version=1.0.0.0, Culture=neutral, PublicKeyToken=858f8f13980e4745</Assembly>
-    <Class>conceptSearching.Sharepoint.ContentTypes.CSHandleEvent</Class>
-    <Data/>
-    <Filter/>
-  </Receiver>
-  <Receiver>
-    <Name>ItemDeletedEventHandlerForConceptSearch</Name>
-    <Synchronization>Default</Synchronization>
-    <Type>10003</Type>
-    <SequenceNumber>10006</SequenceNumber>
-    <Assembly>conceptSearching.Sharepoint.ContentTypes, Version=1.0.0.0, Culture=neutral, PublicKeyToken=858f8f13980e4745</Assembly>
-    <Class>conceptSearching.Sharepoint.ContentTypes.CSHandleEvent</Class>
-    <Data/>
-    <Filter/>
-  </Receiver>
-  <Receiver>
-    <Name>ItemUpdatedEventHandlerForConceptSearch</Name>
-    <Synchronization>Asynchronous</Synchronization>
-    <Type>10002</Type>
-    <SequenceNumber>10001</SequenceNumber>
-    <Assembly>conceptSearching.Sharepoint.ContentTypes2010, Version=1.0.0.0, Culture=neutral, PublicKeyToken=858f8f13980e4745</Assembly>
-    <Class>conceptSearching.Sharepoint.ContentTypes2010.CSHandleEvent</Class>
-    <Data/>
-    <Filter/>
-  </Receiver>
-  <Receiver>
-    <Name>ItemUpdatingEventHandlerForConceptSearch</Name>
-    <Synchronization>Synchronous</Synchronization>
-    <Type>2</Type>
-    <SequenceNumber>10001</SequenceNumber>
-    <Assembly>conceptSearching.Sharepoint.ContentTypes2010, Version=1.0.0.0, Culture=neutral, PublicKeyToken=858f8f13980e4745</Assembly>
-    <Class>conceptSearching.Sharepoint.ContentTypes2010.CSHandleEvent</Class>
-    <Data/>
-    <Filter/>
-  </Receiver>
-  <Receiver>
-    <Name>ItemCheckedInEventHandlerForConceptSearch</Name>
-    <Synchronization>Asynchronous</Synchronization>
-    <Type>10004</Type>
-    <SequenceNumber>10002</SequenceNumber>
-    <Assembly>conceptSearching.Sharepoint.ContentTypes2010, Version=1.0.0.0, Culture=neutral, PublicKeyToken=858f8f13980e4745</Assembly>
-    <Class>conceptSearching.Sharepoint.ContentTypes2010.CSHandleEvent</Class>
-    <Data/>
-    <Filter/>
-  </Receiver>
-  <Receiver>
-    <Name>ItemUncheckedOutEventHandlerForConceptSearch</Name>
-    <Synchronization>Asynchronous</Synchronization>
-    <Type>10006</Type>
-    <SequenceNumber>10003</SequenceNumber>
-    <Assembly>conceptSearching.Sharepoint.ContentTypes2010, Version=1.0.0.0, Culture=neutral, PublicKeyToken=858f8f13980e4745</Assembly>
-    <Class>conceptSearching.Sharepoint.ContentTypes2010.CSHandleEvent</Class>
-    <Data/>
-    <Filter/>
-  </Receiver>
-  <Receiver>
-    <Name>ItemAddedEventHandlerForConceptSearch</Name>
-    <Synchronization>Asynchronous</Synchronization>
-    <Type>10001</Type>
-    <SequenceNumber>10004</SequenceNumber>
-    <Assembly>conceptSearching.Sharepoint.ContentTypes2010, Version=1.0.0.0, Culture=neutral, PublicKeyToken=858f8f13980e4745</Assembly>
-    <Class>conceptSearching.Sharepoint.ContentTypes2010.CSHandleEvent</Class>
-    <Data/>
-    <Filter/>
-  </Receiver>
-  <Receiver>
-    <Name>ItemFileMovedEventHandlerForConceptSearch</Name>
-    <Synchronization>Asynchronous</Synchronization>
-    <Type>10009</Type>
-    <SequenceNumber>10005</SequenceNumber>
-    <Assembly>conceptSearching.Sharepoint.ContentTypes2010, Version=1.0.0.0, Culture=neutral, PublicKeyToken=858f8f13980e4745</Assembly>
-    <Class>conceptSearching.Sharepoint.ContentTypes2010.CSHandleEvent</Class>
-    <Data/>
-    <Filter/>
-  </Receiver>
-  <Receiver>
-    <Name>ItemDeletedEventHandlerForConceptSearch</Name>
-    <Synchronization>Asynchronous</Synchronization>
-    <Type>10003</Type>
-    <SequenceNumber>10006</SequenceNumber>
-    <Assembly>conceptSearching.Sharepoint.ContentTypes2010, Version=1.0.0.0, Culture=neutral, PublicKeyToken=858f8f13980e4745</Assembly>
-    <Class>conceptSearching.Sharepoint.ContentTypes2010.CSHandleEvent</Class>
-    <Data/>
-    <Filter/>
-  </Receiver>
-</spe:Receivers>
-</file>
-
-<file path=customXml/item4.xml><?xml version="1.0" encoding="utf-8"?>
 <ct:contentTypeSchema xmlns:ct="http://schemas.microsoft.com/office/2006/metadata/contentType" xmlns:ma="http://schemas.microsoft.com/office/2006/metadata/properties/metaAttributes" ct:_="" ma:_="" ma:contentTypeName="Business Support" ma:contentTypeID="0x010100DCE5D5DBCBA6844C95AAA11EB3A32719002FF8385B8572694FA7ACC1CC37F60277" ma:contentTypeVersion="65" ma:contentTypeDescription="" ma:contentTypeScope="" ma:versionID="85742d29343d3d707be115dda7510c94">
   <xsd:schema xmlns:xsd="http://www.w3.org/2001/XMLSchema" xmlns:xs="http://www.w3.org/2001/XMLSchema" xmlns:p="http://schemas.microsoft.com/office/2006/metadata/properties" xmlns:ns1="http://schemas.microsoft.com/sharepoint/v3" xmlns:ns2="d95a5b16-1b8d-4c7c-9ebf-89c0983b6970" targetNamespace="http://schemas.microsoft.com/office/2006/metadata/properties" ma:root="true" ma:fieldsID="2ea064cf91f95ad35f4cedd5f5692bc0" ns1:_="" ns2:_="">
     <xsd:import namespace="http://schemas.microsoft.com/sharepoint/v3"/>
@@ -49057,6 +49824,196 @@
 </ct:contentTypeSchema>
 </file>
 
+<file path=customXml/item3.xml><?xml version="1.0" encoding="utf-8"?>
+<?mso-contentType ?>
+<spe:Receivers xmlns:spe="http://schemas.microsoft.com/sharepoint/events">
+  <Receiver>
+    <Name>ItemUpdatedEventHandlerForConceptSearch</Name>
+    <Synchronization>Default</Synchronization>
+    <Type>10002</Type>
+    <SequenceNumber>10001</SequenceNumber>
+    <Assembly>conceptSearching.Sharepoint.ContentTypes, Version=1.0.0.0, Culture=neutral, PublicKeyToken=858f8f13980e4745</Assembly>
+    <Class>conceptSearching.Sharepoint.ContentTypes.CSHandleEvent</Class>
+    <Data/>
+    <Filter/>
+  </Receiver>
+  <Receiver>
+    <Name>ItemCheckedInEventHandlerForConceptSearch</Name>
+    <Synchronization>Default</Synchronization>
+    <Type>10004</Type>
+    <SequenceNumber>10002</SequenceNumber>
+    <Assembly>conceptSearching.Sharepoint.ContentTypes, Version=1.0.0.0, Culture=neutral, PublicKeyToken=858f8f13980e4745</Assembly>
+    <Class>conceptSearching.Sharepoint.ContentTypes.CSHandleEvent</Class>
+    <Data/>
+    <Filter/>
+  </Receiver>
+  <Receiver>
+    <Name>ItemUncheckedOutEventHandlerForConceptSearch</Name>
+    <Synchronization>Default</Synchronization>
+    <Type>10006</Type>
+    <SequenceNumber>10003</SequenceNumber>
+    <Assembly>conceptSearching.Sharepoint.ContentTypes, Version=1.0.0.0, Culture=neutral, PublicKeyToken=858f8f13980e4745</Assembly>
+    <Class>conceptSearching.Sharepoint.ContentTypes.CSHandleEvent</Class>
+    <Data/>
+    <Filter/>
+  </Receiver>
+  <Receiver>
+    <Name>ItemAddedEventHandlerForConceptSearch</Name>
+    <Synchronization>Default</Synchronization>
+    <Type>10001</Type>
+    <SequenceNumber>10004</SequenceNumber>
+    <Assembly>conceptSearching.Sharepoint.ContentTypes, Version=1.0.0.0, Culture=neutral, PublicKeyToken=858f8f13980e4745</Assembly>
+    <Class>conceptSearching.Sharepoint.ContentTypes.CSHandleEvent</Class>
+    <Data/>
+    <Filter/>
+  </Receiver>
+  <Receiver>
+    <Name>ItemFileMovedEventHandlerForConceptSearch</Name>
+    <Synchronization>Default</Synchronization>
+    <Type>10009</Type>
+    <SequenceNumber>10005</SequenceNumber>
+    <Assembly>conceptSearching.Sharepoint.ContentTypes, Version=1.0.0.0, Culture=neutral, PublicKeyToken=858f8f13980e4745</Assembly>
+    <Class>conceptSearching.Sharepoint.ContentTypes.CSHandleEvent</Class>
+    <Data/>
+    <Filter/>
+  </Receiver>
+  <Receiver>
+    <Name>ItemDeletedEventHandlerForConceptSearch</Name>
+    <Synchronization>Default</Synchronization>
+    <Type>10003</Type>
+    <SequenceNumber>10006</SequenceNumber>
+    <Assembly>conceptSearching.Sharepoint.ContentTypes, Version=1.0.0.0, Culture=neutral, PublicKeyToken=858f8f13980e4745</Assembly>
+    <Class>conceptSearching.Sharepoint.ContentTypes.CSHandleEvent</Class>
+    <Data/>
+    <Filter/>
+  </Receiver>
+  <Receiver>
+    <Name>ItemUpdatedEventHandlerForConceptSearch</Name>
+    <Synchronization>Asynchronous</Synchronization>
+    <Type>10002</Type>
+    <SequenceNumber>10001</SequenceNumber>
+    <Assembly>conceptSearching.Sharepoint.ContentTypes2010, Version=1.0.0.0, Culture=neutral, PublicKeyToken=858f8f13980e4745</Assembly>
+    <Class>conceptSearching.Sharepoint.ContentTypes2010.CSHandleEvent</Class>
+    <Data/>
+    <Filter/>
+  </Receiver>
+  <Receiver>
+    <Name>ItemUpdatingEventHandlerForConceptSearch</Name>
+    <Synchronization>Synchronous</Synchronization>
+    <Type>2</Type>
+    <SequenceNumber>10001</SequenceNumber>
+    <Assembly>conceptSearching.Sharepoint.ContentTypes2010, Version=1.0.0.0, Culture=neutral, PublicKeyToken=858f8f13980e4745</Assembly>
+    <Class>conceptSearching.Sharepoint.ContentTypes2010.CSHandleEvent</Class>
+    <Data/>
+    <Filter/>
+  </Receiver>
+  <Receiver>
+    <Name>ItemCheckedInEventHandlerForConceptSearch</Name>
+    <Synchronization>Asynchronous</Synchronization>
+    <Type>10004</Type>
+    <SequenceNumber>10002</SequenceNumber>
+    <Assembly>conceptSearching.Sharepoint.ContentTypes2010, Version=1.0.0.0, Culture=neutral, PublicKeyToken=858f8f13980e4745</Assembly>
+    <Class>conceptSearching.Sharepoint.ContentTypes2010.CSHandleEvent</Class>
+    <Data/>
+    <Filter/>
+  </Receiver>
+  <Receiver>
+    <Name>ItemUncheckedOutEventHandlerForConceptSearch</Name>
+    <Synchronization>Asynchronous</Synchronization>
+    <Type>10006</Type>
+    <SequenceNumber>10003</SequenceNumber>
+    <Assembly>conceptSearching.Sharepoint.ContentTypes2010, Version=1.0.0.0, Culture=neutral, PublicKeyToken=858f8f13980e4745</Assembly>
+    <Class>conceptSearching.Sharepoint.ContentTypes2010.CSHandleEvent</Class>
+    <Data/>
+    <Filter/>
+  </Receiver>
+  <Receiver>
+    <Name>ItemAddedEventHandlerForConceptSearch</Name>
+    <Synchronization>Asynchronous</Synchronization>
+    <Type>10001</Type>
+    <SequenceNumber>10004</SequenceNumber>
+    <Assembly>conceptSearching.Sharepoint.ContentTypes2010, Version=1.0.0.0, Culture=neutral, PublicKeyToken=858f8f13980e4745</Assembly>
+    <Class>conceptSearching.Sharepoint.ContentTypes2010.CSHandleEvent</Class>
+    <Data/>
+    <Filter/>
+  </Receiver>
+  <Receiver>
+    <Name>ItemFileMovedEventHandlerForConceptSearch</Name>
+    <Synchronization>Asynchronous</Synchronization>
+    <Type>10009</Type>
+    <SequenceNumber>10005</SequenceNumber>
+    <Assembly>conceptSearching.Sharepoint.ContentTypes2010, Version=1.0.0.0, Culture=neutral, PublicKeyToken=858f8f13980e4745</Assembly>
+    <Class>conceptSearching.Sharepoint.ContentTypes2010.CSHandleEvent</Class>
+    <Data/>
+    <Filter/>
+  </Receiver>
+  <Receiver>
+    <Name>ItemDeletedEventHandlerForConceptSearch</Name>
+    <Synchronization>Asynchronous</Synchronization>
+    <Type>10003</Type>
+    <SequenceNumber>10006</SequenceNumber>
+    <Assembly>conceptSearching.Sharepoint.ContentTypes2010, Version=1.0.0.0, Culture=neutral, PublicKeyToken=858f8f13980e4745</Assembly>
+    <Class>conceptSearching.Sharepoint.ContentTypes2010.CSHandleEvent</Class>
+    <Data/>
+    <Filter/>
+  </Receiver>
+</spe:Receivers>
+</file>
+
+<file path=customXml/item4.xml><?xml version="1.0" encoding="utf-8"?>
+<p:properties xmlns:p="http://schemas.microsoft.com/office/2006/metadata/properties" xmlns:xsi="http://www.w3.org/2001/XMLSchema-instance">
+  <documentManagement>
+    <c5aebc35b3e840e5912c276ffe755dcf xmlns="d95a5b16-1b8d-4c7c-9ebf-89c0983b6970">
+      <Terms xmlns="http://schemas.microsoft.com/office/infopath/2007/PartnerControls"/>
+    </c5aebc35b3e840e5912c276ffe755dcf>
+    <c79d12643ffc4d60ab657aaa1718cc32 xmlns="d95a5b16-1b8d-4c7c-9ebf-89c0983b6970">
+      <Terms xmlns="http://schemas.microsoft.com/office/infopath/2007/PartnerControls">
+        <TermInfo xmlns="http://schemas.microsoft.com/office/infopath/2007/PartnerControls">
+          <TermName xmlns="http://schemas.microsoft.com/office/infopath/2007/PartnerControls">Global</TermName>
+          <TermId xmlns="http://schemas.microsoft.com/office/infopath/2007/PartnerControls">43ac7042-3752-4f1b-8a93-43b36e65d3e5</TermId>
+        </TermInfo>
+      </Terms>
+    </c79d12643ffc4d60ab657aaa1718cc32>
+    <p43f7bb208e443c9b50eb304fe6606a3 xmlns="d95a5b16-1b8d-4c7c-9ebf-89c0983b6970">
+      <Terms xmlns="http://schemas.microsoft.com/office/infopath/2007/PartnerControls"/>
+    </p43f7bb208e443c9b50eb304fe6606a3>
+    <TaxCatchAll xmlns="d95a5b16-1b8d-4c7c-9ebf-89c0983b6970">
+      <Value>260</Value>
+    </TaxCatchAll>
+    <h4c66fbf292e4125b0e390af25f11c04 xmlns="d95a5b16-1b8d-4c7c-9ebf-89c0983b6970">
+      <Terms xmlns="http://schemas.microsoft.com/office/infopath/2007/PartnerControls"/>
+    </h4c66fbf292e4125b0e390af25f11c04>
+    <eafb632c3f5c40ba98242be6bbd6bb17 xmlns="d95a5b16-1b8d-4c7c-9ebf-89c0983b6970">
+      <Terms xmlns="http://schemas.microsoft.com/office/infopath/2007/PartnerControls"/>
+    </eafb632c3f5c40ba98242be6bbd6bb17>
+    <Creator xmlns="d95a5b16-1b8d-4c7c-9ebf-89c0983b6970" xsi:nil="true"/>
+    <Language xmlns="http://schemas.microsoft.com/sharepoint/v3">EN</Language>
+    <Abstract xmlns="d95a5b16-1b8d-4c7c-9ebf-89c0983b6970">CGI-beet-option_EN</Abstract>
+    <External_x0020_Use xmlns="d95a5b16-1b8d-4c7c-9ebf-89c0983b6970">No</External_x0020_Use>
+    <Owner_x0020_Organisation xmlns="d95a5b16-1b8d-4c7c-9ebf-89c0983b6970">Group</Owner_x0020_Organisation>
+    <BS_x0020_Document_x0020_Sub_x0020_Type xmlns="d95a5b16-1b8d-4c7c-9ebf-89c0983b6970">Pro Forma</BS_x0020_Document_x0020_Sub_x0020_Type>
+    <Market xmlns="d95a5b16-1b8d-4c7c-9ebf-89c0983b6970"/>
+    <Best_x0020_Before_x0020_Date xmlns="d95a5b16-1b8d-4c7c-9ebf-89c0983b6970">2020-08-28T23:00:00+00:00</Best_x0020_Before_x0020_Date>
+    <Published_x0020_By xmlns="d95a5b16-1b8d-4c7c-9ebf-89c0983b6970">
+      <UserInfo>
+        <DisplayName>Stiller, Regina C</DisplayName>
+        <AccountId>55167</AccountId>
+        <AccountType/>
+      </UserInfo>
+    </Published_x0020_By>
+    <Publication_x0020_Date xmlns="d95a5b16-1b8d-4c7c-9ebf-89c0983b6970">2015-08-28T23:00:00+00:00</Publication_x0020_Date>
+    <Geographic_x0020_Region xmlns="d95a5b16-1b8d-4c7c-9ebf-89c0983b6970"/>
+    <TaxKeywordTaxHTField xmlns="d95a5b16-1b8d-4c7c-9ebf-89c0983b6970">
+      <Terms xmlns="http://schemas.microsoft.com/office/infopath/2007/PartnerControls"/>
+    </TaxKeywordTaxHTField>
+    <b0f7c43cb32a4bb99696cc0157e407bc xmlns="d95a5b16-1b8d-4c7c-9ebf-89c0983b6970">
+      <Terms xmlns="http://schemas.microsoft.com/office/infopath/2007/PartnerControls"/>
+    </b0f7c43cb32a4bb99696cc0157e407bc>
+    <CSMeta2010Field xmlns="http://schemas.microsoft.com/sharepoint/v3">a1a8a2be-0578-4c61-8abd-6dccca5e33fd;2017-08-30 20:15:33;AUTOCLASSIFIED;Business theme:2017-08-30 20:15:33|False||AUTOCLASSIFIED|2017-08-30 20:15:33|UNDEFINED|943f7bb2-08e4-43c9-b50e-b304fe6606a3;Organization:2017-08-30 20:15:33|False||AUTOCLASSIFIED|2017-08-30 20:15:33|UNDEFINED|c79d1264-3ffc-4d60-ab65-7aaa1718cc32;Sector:2017-08-30 20:15:33|False||AUTOCLASSIFIED|2017-08-30 20:15:33|UNDEFINED|c5aebc35-b3e8-40e5-912c-276ffe755dcf;Proposition:2017-08-30 20:15:33|False||AUTOCLASSIFIED|2017-08-30 20:15:33|UNDEFINED|14c66fbf-292e-4125-b0e3-90af25f11c04;Service line:2017-08-30 20:15:33|False||AUTOCLASSIFIED|2017-08-30 20:15:33|UNDEFINED|eafb632c-3f5c-40ba-9824-2be6bbd6bb17;Business Practice:2017-08-30 20:15:33|False||AUTOCLASSIFIED|2017-08-30 20:15:33|UNDEFINED|b0f7c43c-b32a-4bb9-9696-cc0157e407bc;False</CSMeta2010Field>
+  </documentManagement>
+</p:properties>
+</file>
+
 <file path=customXml/itemProps1.xml><?xml version="1.0" encoding="utf-8"?>
 <ds:datastoreItem xmlns:ds="http://schemas.openxmlformats.org/officeDocument/2006/customXml" ds:itemID="{ADA5D674-9920-4D2F-B065-BC24FD29F86D}">
   <ds:schemaRefs>
@@ -49066,31 +50023,6 @@
 </file>
 
 <file path=customXml/itemProps2.xml><?xml version="1.0" encoding="utf-8"?>
-<ds:datastoreItem xmlns:ds="http://schemas.openxmlformats.org/officeDocument/2006/customXml" ds:itemID="{2F4C4F6A-F6A5-45C8-BAAA-52FB70E387C7}">
-  <ds:schemaRefs>
-    <ds:schemaRef ds:uri="http://schemas.microsoft.com/office/2006/documentManagement/types"/>
-    <ds:schemaRef ds:uri="http://schemas.microsoft.com/office/2006/metadata/properties"/>
-    <ds:schemaRef ds:uri="d95a5b16-1b8d-4c7c-9ebf-89c0983b6970"/>
-    <ds:schemaRef ds:uri="http://www.w3.org/XML/1998/namespace"/>
-    <ds:schemaRef ds:uri="http://purl.org/dc/dcmitype/"/>
-    <ds:schemaRef ds:uri="http://purl.org/dc/elements/1.1/"/>
-    <ds:schemaRef ds:uri="http://schemas.microsoft.com/office/infopath/2007/PartnerControls"/>
-    <ds:schemaRef ds:uri="http://schemas.openxmlformats.org/package/2006/metadata/core-properties"/>
-    <ds:schemaRef ds:uri="http://schemas.microsoft.com/sharepoint/v3"/>
-    <ds:schemaRef ds:uri="http://purl.org/dc/terms/"/>
-  </ds:schemaRefs>
-</ds:datastoreItem>
-</file>
-
-<file path=customXml/itemProps3.xml><?xml version="1.0" encoding="utf-8"?>
-<ds:datastoreItem xmlns:ds="http://schemas.openxmlformats.org/officeDocument/2006/customXml" ds:itemID="{2D878581-91F4-4FF4-B9D6-BDFD7A656587}">
-  <ds:schemaRefs>
-    <ds:schemaRef ds:uri="http://schemas.microsoft.com/sharepoint/events"/>
-  </ds:schemaRefs>
-</ds:datastoreItem>
-</file>
-
-<file path=customXml/itemProps4.xml><?xml version="1.0" encoding="utf-8"?>
 <ds:datastoreItem xmlns:ds="http://schemas.openxmlformats.org/officeDocument/2006/customXml" ds:itemID="{C48E9891-B8FE-479E-891F-02429D80F3CB}">
   <ds:schemaRefs>
     <ds:schemaRef ds:uri="http://schemas.microsoft.com/office/2006/metadata/contentType"/>
@@ -49107,4 +50039,29 @@
     <ds:schemaRef ds:uri="http://schemas.microsoft.com/internal/obd"/>
   </ds:schemaRefs>
 </ds:datastoreItem>
+</file>
+
+<file path=customXml/itemProps3.xml><?xml version="1.0" encoding="utf-8"?>
+<ds:datastoreItem xmlns:ds="http://schemas.openxmlformats.org/officeDocument/2006/customXml" ds:itemID="{2D878581-91F4-4FF4-B9D6-BDFD7A656587}">
+  <ds:schemaRefs>
+    <ds:schemaRef ds:uri="http://schemas.microsoft.com/sharepoint/events"/>
+  </ds:schemaRefs>
+</ds:datastoreItem>
+</file>
+
+<file path=customXml/itemProps4.xml><?xml version="1.0" encoding="utf-8"?>
+<ds:datastoreItem xmlns:ds="http://schemas.openxmlformats.org/officeDocument/2006/customXml" ds:itemID="{2F4C4F6A-F6A5-45C8-BAAA-52FB70E387C7}">
+  <ds:schemaRefs>
+    <ds:schemaRef ds:uri="http://schemas.microsoft.com/office/2006/documentManagement/types"/>
+    <ds:schemaRef ds:uri="http://schemas.microsoft.com/office/2006/metadata/properties"/>
+    <ds:schemaRef ds:uri="d95a5b16-1b8d-4c7c-9ebf-89c0983b6970"/>
+    <ds:schemaRef ds:uri="http://www.w3.org/XML/1998/namespace"/>
+    <ds:schemaRef ds:uri="http://purl.org/dc/dcmitype/"/>
+    <ds:schemaRef ds:uri="http://purl.org/dc/elements/1.1/"/>
+    <ds:schemaRef ds:uri="http://schemas.microsoft.com/office/infopath/2007/PartnerControls"/>
+    <ds:schemaRef ds:uri="http://schemas.openxmlformats.org/package/2006/metadata/core-properties"/>
+    <ds:schemaRef ds:uri="http://schemas.microsoft.com/sharepoint/v3"/>
+    <ds:schemaRef ds:uri="http://purl.org/dc/terms/"/>
+  </ds:schemaRefs>
+</ds:datastoreItem>
 </file>
</xml_diff>